<commit_message>
Change order of slides, change monaco font to something more general
</commit_message>
<xml_diff>
--- a/2017-2018/Presentations/CrashCourse_2016.pptx
+++ b/2017-2018/Presentations/CrashCourse_2016.pptx
@@ -6,16 +6,16 @@
     <p:sldMasterId id="2147483677" r:id="rId2"/>
   </p:sldMasterIdLst>
   <p:notesMasterIdLst>
-    <p:notesMasterId r:id="rId36"/>
+    <p:notesMasterId r:id="rId37"/>
   </p:notesMasterIdLst>
   <p:sldIdLst>
     <p:sldId id="256" r:id="rId3"/>
     <p:sldId id="363" r:id="rId4"/>
     <p:sldId id="257" r:id="rId5"/>
     <p:sldId id="394" r:id="rId6"/>
-    <p:sldId id="340" r:id="rId7"/>
-    <p:sldId id="341" r:id="rId8"/>
-    <p:sldId id="342" r:id="rId9"/>
+    <p:sldId id="342" r:id="rId7"/>
+    <p:sldId id="340" r:id="rId8"/>
+    <p:sldId id="341" r:id="rId9"/>
     <p:sldId id="344" r:id="rId10"/>
     <p:sldId id="345" r:id="rId11"/>
     <p:sldId id="346" r:id="rId12"/>
@@ -26,22 +26,23 @@
     <p:sldId id="401" r:id="rId17"/>
     <p:sldId id="402" r:id="rId18"/>
     <p:sldId id="403" r:id="rId19"/>
-    <p:sldId id="368" r:id="rId20"/>
-    <p:sldId id="369" r:id="rId21"/>
-    <p:sldId id="370" r:id="rId22"/>
-    <p:sldId id="371" r:id="rId23"/>
-    <p:sldId id="372" r:id="rId24"/>
-    <p:sldId id="366" r:id="rId25"/>
-    <p:sldId id="373" r:id="rId26"/>
-    <p:sldId id="374" r:id="rId27"/>
-    <p:sldId id="395" r:id="rId28"/>
-    <p:sldId id="396" r:id="rId29"/>
-    <p:sldId id="375" r:id="rId30"/>
-    <p:sldId id="380" r:id="rId31"/>
-    <p:sldId id="381" r:id="rId32"/>
-    <p:sldId id="382" r:id="rId33"/>
-    <p:sldId id="383" r:id="rId34"/>
-    <p:sldId id="384" r:id="rId35"/>
+    <p:sldId id="384" r:id="rId20"/>
+    <p:sldId id="383" r:id="rId21"/>
+    <p:sldId id="368" r:id="rId22"/>
+    <p:sldId id="369" r:id="rId23"/>
+    <p:sldId id="370" r:id="rId24"/>
+    <p:sldId id="371" r:id="rId25"/>
+    <p:sldId id="372" r:id="rId26"/>
+    <p:sldId id="366" r:id="rId27"/>
+    <p:sldId id="373" r:id="rId28"/>
+    <p:sldId id="404" r:id="rId29"/>
+    <p:sldId id="374" r:id="rId30"/>
+    <p:sldId id="395" r:id="rId31"/>
+    <p:sldId id="396" r:id="rId32"/>
+    <p:sldId id="375" r:id="rId33"/>
+    <p:sldId id="380" r:id="rId34"/>
+    <p:sldId id="381" r:id="rId35"/>
+    <p:sldId id="382" r:id="rId36"/>
   </p:sldIdLst>
   <p:sldSz cx="10160000" cy="7620000"/>
   <p:notesSz cx="6858000" cy="9144000"/>
@@ -740,7 +741,7 @@
               <a:pPr>
                 <a:defRPr/>
               </a:pPr>
-              <a:t>19</a:t>
+              <a:t>21</a:t>
             </a:fld>
             <a:endParaRPr lang="en-GB"/>
           </a:p>
@@ -7348,13 +7349,7 @@
               <a:rPr lang="en-US" sz="2000" dirty="0" smtClean="0">
                 <a:latin typeface="+mj-lt"/>
               </a:rPr>
-              <a:t>19</a:t>
-            </a:r>
-            <a:r>
-              <a:rPr lang="en-US" sz="2000" smtClean="0">
-                <a:latin typeface="+mj-lt"/>
-              </a:rPr>
-              <a:t>, 2017</a:t>
+              <a:t>19, 2017</a:t>
             </a:r>
             <a:endParaRPr lang="en-US" sz="2000" dirty="0" smtClean="0">
               <a:latin typeface="+mj-lt"/>
@@ -9442,6 +9437,442 @@
       </p:grpSpPr>
       <p:sp>
         <p:nvSpPr>
+          <p:cNvPr id="2" name="Title 1"/>
+          <p:cNvSpPr>
+            <a:spLocks noGrp="1"/>
+          </p:cNvSpPr>
+          <p:nvPr>
+            <p:ph type="title"/>
+          </p:nvPr>
+        </p:nvSpPr>
+        <p:spPr/>
+        <p:txBody>
+          <a:bodyPr/>
+          <a:lstStyle/>
+          <a:p>
+            <a:r>
+              <a:rPr lang="en-GB" dirty="0" smtClean="0"/>
+              <a:t>Break</a:t>
+            </a:r>
+            <a:endParaRPr lang="en-GB" dirty="0"/>
+          </a:p>
+        </p:txBody>
+      </p:sp>
+      <p:sp>
+        <p:nvSpPr>
+          <p:cNvPr id="3" name="Content Placeholder 2"/>
+          <p:cNvSpPr>
+            <a:spLocks noGrp="1"/>
+          </p:cNvSpPr>
+          <p:nvPr>
+            <p:ph idx="1"/>
+          </p:nvPr>
+        </p:nvSpPr>
+        <p:spPr/>
+        <p:txBody>
+          <a:bodyPr/>
+          <a:lstStyle/>
+          <a:p>
+            <a:r>
+              <a:rPr lang="en-GB" dirty="0" smtClean="0"/>
+              <a:t>Time to activate and borrow your license!</a:t>
+            </a:r>
+            <a:endParaRPr lang="en-GB" dirty="0"/>
+          </a:p>
+        </p:txBody>
+      </p:sp>
+    </p:spTree>
+    <p:extLst>
+      <p:ext uri="{BB962C8B-B14F-4D97-AF65-F5344CB8AC3E}">
+        <p14:creationId xmlns:p14="http://schemas.microsoft.com/office/powerpoint/2010/main" val="130277479"/>
+      </p:ext>
+    </p:extLst>
+  </p:cSld>
+  <p:clrMapOvr>
+    <a:masterClrMapping/>
+  </p:clrMapOvr>
+</p:sld>
+</file>
+
+<file path=ppt/slides/slide19.xml><?xml version="1.0" encoding="utf-8"?>
+<p:sld xmlns:a="http://schemas.openxmlformats.org/drawingml/2006/main" xmlns:r="http://schemas.openxmlformats.org/officeDocument/2006/relationships" xmlns:p="http://schemas.openxmlformats.org/presentationml/2006/main">
+  <p:cSld>
+    <p:spTree>
+      <p:nvGrpSpPr>
+        <p:cNvPr id="1" name=""/>
+        <p:cNvGrpSpPr/>
+        <p:nvPr/>
+      </p:nvGrpSpPr>
+      <p:grpSpPr>
+        <a:xfrm>
+          <a:off x="0" y="0"/>
+          <a:ext cx="0" cy="0"/>
+          <a:chOff x="0" y="0"/>
+          <a:chExt cx="0" cy="0"/>
+        </a:xfrm>
+      </p:grpSpPr>
+      <p:sp>
+        <p:nvSpPr>
+          <p:cNvPr id="15362" name="Title 1"/>
+          <p:cNvSpPr>
+            <a:spLocks noGrp="1"/>
+          </p:cNvSpPr>
+          <p:nvPr>
+            <p:ph type="title"/>
+          </p:nvPr>
+        </p:nvSpPr>
+        <p:spPr/>
+        <p:txBody>
+          <a:bodyPr/>
+          <a:lstStyle/>
+          <a:p>
+            <a:r>
+              <a:rPr lang="en-GB" altLang="nl-BE" smtClean="0">
+                <a:latin typeface="Arial" charset="0"/>
+                <a:cs typeface="Arial" charset="0"/>
+              </a:rPr>
+              <a:t>Use of Dymola with KULeuven license</a:t>
+            </a:r>
+            <a:endParaRPr lang="nl-BE" altLang="nl-BE" smtClean="0"/>
+          </a:p>
+        </p:txBody>
+      </p:sp>
+      <p:sp>
+        <p:nvSpPr>
+          <p:cNvPr id="3" name="Content Placeholder 2"/>
+          <p:cNvSpPr>
+            <a:spLocks noGrp="1"/>
+          </p:cNvSpPr>
+          <p:nvPr>
+            <p:ph idx="1"/>
+          </p:nvPr>
+        </p:nvSpPr>
+        <p:spPr/>
+        <p:txBody>
+          <a:bodyPr/>
+          <a:lstStyle/>
+          <a:p>
+            <a:pPr marL="0" indent="0">
+              <a:buFontTx/>
+              <a:buNone/>
+              <a:defRPr/>
+            </a:pPr>
+            <a:r>
+              <a:rPr lang="nl-BE" dirty="0" smtClean="0"/>
+              <a:t>Access to a floating licence (on the building physics server).</a:t>
+            </a:r>
+          </a:p>
+          <a:p>
+            <a:pPr>
+              <a:defRPr/>
+            </a:pPr>
+            <a:r>
+              <a:rPr lang="nl-BE" dirty="0" smtClean="0"/>
+              <a:t>Connected physically</a:t>
+            </a:r>
+            <a:r>
+              <a:rPr lang="nl-BE" dirty="0"/>
+              <a:t> (cable)</a:t>
+            </a:r>
+            <a:r>
+              <a:rPr lang="nl-BE" dirty="0" smtClean="0"/>
+              <a:t> to the building physics or  mech network</a:t>
+            </a:r>
+          </a:p>
+          <a:p>
+            <a:pPr>
+              <a:defRPr/>
+            </a:pPr>
+            <a:r>
+              <a:rPr lang="nl-BE" dirty="0" smtClean="0"/>
+              <a:t>Open Dymola and go to help&gt;licence..</a:t>
+            </a:r>
+          </a:p>
+          <a:p>
+            <a:pPr>
+              <a:defRPr/>
+            </a:pPr>
+            <a:r>
+              <a:rPr lang="nl-NL" b="1" dirty="0" smtClean="0"/>
+              <a:t>Enter 10.112.72.4</a:t>
+            </a:r>
+            <a:r>
+              <a:rPr lang="nl-NL" dirty="0" smtClean="0"/>
+              <a:t> </a:t>
+            </a:r>
+            <a:br>
+              <a:rPr lang="nl-NL" dirty="0" smtClean="0"/>
+            </a:br>
+            <a:r>
+              <a:rPr lang="nl-NL" dirty="0" smtClean="0"/>
+              <a:t>and follow instructions</a:t>
+            </a:r>
+          </a:p>
+          <a:p>
+            <a:pPr>
+              <a:defRPr/>
+            </a:pPr>
+            <a:endParaRPr lang="nl-NL" dirty="0"/>
+          </a:p>
+          <a:p>
+            <a:pPr>
+              <a:defRPr/>
+            </a:pPr>
+            <a:r>
+              <a:rPr lang="nl-NL" dirty="0" smtClean="0"/>
+              <a:t>More information on </a:t>
+            </a:r>
+            <a:r>
+              <a:rPr lang="nl-NL" dirty="0" smtClean="0">
+                <a:hlinkClick r:id="rId2"/>
+              </a:rPr>
+              <a:t>Modelicans</a:t>
+            </a:r>
+            <a:r>
+              <a:rPr lang="nl-NL" dirty="0" smtClean="0"/>
+              <a:t> (google groups)</a:t>
+            </a:r>
+            <a:endParaRPr lang="nl-BE" dirty="0"/>
+          </a:p>
+        </p:txBody>
+      </p:sp>
+      <p:pic>
+        <p:nvPicPr>
+          <p:cNvPr id="15364" name="Picture 4"/>
+          <p:cNvPicPr>
+            <a:picLocks noChangeAspect="1" noChangeArrowheads="1"/>
+          </p:cNvPicPr>
+          <p:nvPr/>
+        </p:nvPicPr>
+        <p:blipFill>
+          <a:blip r:embed="rId3">
+            <a:extLst>
+              <a:ext uri="{28A0092B-C50C-407E-A947-70E740481C1C}">
+                <a14:useLocalDpi xmlns:a14="http://schemas.microsoft.com/office/drawing/2010/main" val="0"/>
+              </a:ext>
+            </a:extLst>
+          </a:blip>
+          <a:srcRect/>
+          <a:stretch>
+            <a:fillRect/>
+          </a:stretch>
+        </p:blipFill>
+        <p:spPr bwMode="auto">
+          <a:xfrm>
+            <a:off x="4431928" y="5466184"/>
+            <a:ext cx="3590925" cy="1581150"/>
+          </a:xfrm>
+          <a:prstGeom prst="rect">
+            <a:avLst/>
+          </a:prstGeom>
+          <a:noFill/>
+          <a:ln>
+            <a:noFill/>
+          </a:ln>
+          <a:extLst>
+            <a:ext uri="{909E8E84-426E-40DD-AFC4-6F175D3DCCD1}">
+              <a14:hiddenFill xmlns:a14="http://schemas.microsoft.com/office/drawing/2010/main">
+                <a:solidFill>
+                  <a:schemeClr val="accent1"/>
+                </a:solidFill>
+              </a14:hiddenFill>
+            </a:ext>
+            <a:ext uri="{91240B29-F687-4F45-9708-019B960494DF}">
+              <a14:hiddenLine xmlns:a14="http://schemas.microsoft.com/office/drawing/2010/main" w="9525">
+                <a:solidFill>
+                  <a:schemeClr val="tx1"/>
+                </a:solidFill>
+                <a:miter lim="800000"/>
+                <a:headEnd/>
+                <a:tailEnd/>
+              </a14:hiddenLine>
+            </a:ext>
+          </a:extLst>
+        </p:spPr>
+      </p:pic>
+    </p:spTree>
+    <p:extLst>
+      <p:ext uri="{BB962C8B-B14F-4D97-AF65-F5344CB8AC3E}">
+        <p14:creationId xmlns:p14="http://schemas.microsoft.com/office/powerpoint/2010/main" val="3727398000"/>
+      </p:ext>
+    </p:extLst>
+  </p:cSld>
+  <p:clrMapOvr>
+    <a:masterClrMapping/>
+  </p:clrMapOvr>
+  <p:timing>
+    <p:tnLst>
+      <p:par>
+        <p:cTn id="1" dur="indefinite" restart="never" nodeType="tmRoot"/>
+      </p:par>
+    </p:tnLst>
+  </p:timing>
+</p:sld>
+</file>
+
+<file path=ppt/slides/slide2.xml><?xml version="1.0" encoding="utf-8"?>
+<p:sld xmlns:a="http://schemas.openxmlformats.org/drawingml/2006/main" xmlns:r="http://schemas.openxmlformats.org/officeDocument/2006/relationships" xmlns:p="http://schemas.openxmlformats.org/presentationml/2006/main">
+  <p:cSld>
+    <p:spTree>
+      <p:nvGrpSpPr>
+        <p:cNvPr id="1" name=""/>
+        <p:cNvGrpSpPr/>
+        <p:nvPr/>
+      </p:nvGrpSpPr>
+      <p:grpSpPr>
+        <a:xfrm>
+          <a:off x="0" y="0"/>
+          <a:ext cx="0" cy="0"/>
+          <a:chOff x="0" y="0"/>
+          <a:chExt cx="0" cy="0"/>
+        </a:xfrm>
+      </p:grpSpPr>
+      <p:sp>
+        <p:nvSpPr>
+          <p:cNvPr id="2" name="Title 1"/>
+          <p:cNvSpPr>
+            <a:spLocks noGrp="1"/>
+          </p:cNvSpPr>
+          <p:nvPr>
+            <p:ph type="title"/>
+          </p:nvPr>
+        </p:nvSpPr>
+        <p:spPr/>
+        <p:txBody>
+          <a:bodyPr/>
+          <a:lstStyle/>
+          <a:p>
+            <a:r>
+              <a:rPr lang="nl-NL" smtClean="0"/>
+              <a:t>Modelica crash course</a:t>
+            </a:r>
+            <a:endParaRPr lang="nl-BE" dirty="0"/>
+          </a:p>
+        </p:txBody>
+      </p:sp>
+      <p:sp>
+        <p:nvSpPr>
+          <p:cNvPr id="3" name="Content Placeholder 2"/>
+          <p:cNvSpPr>
+            <a:spLocks noGrp="1"/>
+          </p:cNvSpPr>
+          <p:nvPr>
+            <p:ph idx="1"/>
+          </p:nvPr>
+        </p:nvSpPr>
+        <p:spPr/>
+        <p:txBody>
+          <a:bodyPr/>
+          <a:lstStyle/>
+          <a:p>
+            <a:r>
+              <a:rPr lang="en-US" dirty="0" smtClean="0"/>
+              <a:t>What is </a:t>
+            </a:r>
+            <a:r>
+              <a:rPr lang="en-US" dirty="0" err="1" smtClean="0"/>
+              <a:t>Modelica</a:t>
+            </a:r>
+            <a:r>
+              <a:rPr lang="en-US" dirty="0" smtClean="0"/>
+              <a:t> ? </a:t>
+            </a:r>
+          </a:p>
+          <a:p>
+            <a:r>
+              <a:rPr lang="en-US" dirty="0" smtClean="0"/>
+              <a:t>Syntax, language concepts and model structuring</a:t>
+            </a:r>
+          </a:p>
+          <a:p>
+            <a:r>
+              <a:rPr lang="en-US" dirty="0" err="1" smtClean="0"/>
+              <a:t>Modelica</a:t>
+            </a:r>
+            <a:r>
+              <a:rPr lang="en-US" dirty="0" smtClean="0"/>
+              <a:t> tools</a:t>
+            </a:r>
+          </a:p>
+          <a:p>
+            <a:r>
+              <a:rPr lang="en-US" dirty="0" smtClean="0"/>
+              <a:t>Use of IDEAS library</a:t>
+            </a:r>
+          </a:p>
+          <a:p>
+            <a:r>
+              <a:rPr lang="en-US" dirty="0" smtClean="0"/>
+              <a:t>Getting started (tutorials, reference docs, libraries, software implementations, ...)</a:t>
+            </a:r>
+          </a:p>
+          <a:p>
+            <a:endParaRPr lang="en-US" dirty="0" smtClean="0"/>
+          </a:p>
+          <a:p>
+            <a:r>
+              <a:rPr lang="en-US" dirty="0" smtClean="0">
+                <a:sym typeface="Wingdings" panose="05000000000000000000" pitchFamily="2" charset="2"/>
+              </a:rPr>
+              <a:t></a:t>
+            </a:r>
+            <a:r>
+              <a:rPr lang="en-US" dirty="0" smtClean="0"/>
+              <a:t> To get you started with </a:t>
+            </a:r>
+            <a:r>
+              <a:rPr lang="en-US" dirty="0" err="1" smtClean="0"/>
+              <a:t>Modelica</a:t>
+            </a:r>
+            <a:r>
+              <a:rPr lang="en-US" dirty="0" smtClean="0"/>
+              <a:t>! </a:t>
+            </a:r>
+          </a:p>
+          <a:p>
+            <a:endParaRPr lang="nl-BE" dirty="0"/>
+          </a:p>
+        </p:txBody>
+      </p:sp>
+    </p:spTree>
+    <p:extLst>
+      <p:ext uri="{BB962C8B-B14F-4D97-AF65-F5344CB8AC3E}">
+        <p14:creationId xmlns:p14="http://schemas.microsoft.com/office/powerpoint/2010/main" val="164379939"/>
+      </p:ext>
+    </p:extLst>
+  </p:cSld>
+  <p:clrMapOvr>
+    <a:masterClrMapping/>
+  </p:clrMapOvr>
+  <p:timing>
+    <p:tnLst>
+      <p:par>
+        <p:cTn id="1" dur="indefinite" restart="never" nodeType="tmRoot"/>
+      </p:par>
+    </p:tnLst>
+  </p:timing>
+</p:sld>
+</file>
+
+<file path=ppt/slides/slide20.xml><?xml version="1.0" encoding="utf-8"?>
+<p:sld xmlns:a="http://schemas.openxmlformats.org/drawingml/2006/main" xmlns:r="http://schemas.openxmlformats.org/officeDocument/2006/relationships" xmlns:p="http://schemas.openxmlformats.org/presentationml/2006/main">
+  <p:cSld>
+    <p:spTree>
+      <p:nvGrpSpPr>
+        <p:cNvPr id="1" name=""/>
+        <p:cNvGrpSpPr/>
+        <p:nvPr/>
+      </p:nvGrpSpPr>
+      <p:grpSpPr>
+        <a:xfrm>
+          <a:off x="0" y="0"/>
+          <a:ext cx="0" cy="0"/>
+          <a:chOff x="0" y="0"/>
+          <a:chExt cx="0" cy="0"/>
+        </a:xfrm>
+      </p:grpSpPr>
+      <p:sp>
+        <p:nvSpPr>
           <p:cNvPr id="4" name="Title 3"/>
           <p:cNvSpPr>
             <a:spLocks noGrp="1"/>
@@ -9514,7 +9945,7 @@
 </p:sld>
 </file>
 
-<file path=ppt/slides/slide19.xml><?xml version="1.0" encoding="utf-8"?>
+<file path=ppt/slides/slide21.xml><?xml version="1.0" encoding="utf-8"?>
 <p:sld xmlns:a="http://schemas.openxmlformats.org/drawingml/2006/main" xmlns:r="http://schemas.openxmlformats.org/officeDocument/2006/relationships" xmlns:p="http://schemas.openxmlformats.org/presentationml/2006/main">
   <p:cSld>
     <p:spTree>
@@ -9578,10 +10009,17 @@
             <a:pPr lvl="1"/>
             <a:r>
               <a:rPr lang="en-GB" dirty="0" smtClean="0">
+                <a:latin typeface="Lucida Console" panose="020B0609040504020204" pitchFamily="49" charset="0"/>
+                <a:cs typeface="Monaco"/>
+              </a:rPr>
+              <a:t>*, /, +, -, ^</a:t>
+            </a:r>
+            <a:r>
+              <a:rPr lang="en-GB" dirty="0" smtClean="0">
                 <a:latin typeface="Monaco"/>
                 <a:cs typeface="Monaco"/>
               </a:rPr>
-              <a:t>*, /, +, -, ^ </a:t>
+              <a:t> </a:t>
             </a:r>
             <a:r>
               <a:rPr lang="en-GB" dirty="0" smtClean="0">
@@ -9592,7 +10030,7 @@
             </a:r>
             <a:r>
               <a:rPr lang="en-GB" dirty="0" smtClean="0">
-                <a:latin typeface="Monaco"/>
+                <a:latin typeface="Lucida Console" panose="020B0609040504020204" pitchFamily="49" charset="0"/>
                 <a:cs typeface="Monaco"/>
               </a:rPr>
               <a:t>.</a:t>
@@ -9618,10 +10056,17 @@
             <a:pPr lvl="1"/>
             <a:r>
               <a:rPr lang="en-GB" dirty="0" smtClean="0">
+                <a:latin typeface="Lucida Console" panose="020B0609040504020204" pitchFamily="49" charset="0"/>
+                <a:cs typeface="Monaco"/>
+              </a:rPr>
+              <a:t>der(x) = x</a:t>
+            </a:r>
+            <a:r>
+              <a:rPr lang="en-GB" dirty="0" smtClean="0">
                 <a:latin typeface="Monaco"/>
                 <a:cs typeface="Monaco"/>
               </a:rPr>
-              <a:t>der(x) = x   ~</a:t>
+              <a:t>   ~</a:t>
             </a:r>
           </a:p>
           <a:p>
@@ -9987,7 +10432,7 @@
 </p:sld>
 </file>
 
-<file path=ppt/slides/slide2.xml><?xml version="1.0" encoding="utf-8"?>
+<file path=ppt/slides/slide22.xml><?xml version="1.0" encoding="utf-8"?>
 <p:sld xmlns:a="http://schemas.openxmlformats.org/drawingml/2006/main" xmlns:r="http://schemas.openxmlformats.org/officeDocument/2006/relationships" xmlns:p="http://schemas.openxmlformats.org/presentationml/2006/main">
   <p:cSld>
     <p:spTree>
@@ -10020,10 +10465,10 @@
           <a:lstStyle/>
           <a:p>
             <a:r>
-              <a:rPr lang="nl-NL" smtClean="0"/>
-              <a:t>Modelica crash course</a:t>
-            </a:r>
-            <a:endParaRPr lang="nl-BE" dirty="0"/>
+              <a:rPr lang="en-GB" dirty="0" smtClean="0"/>
+              <a:t>Logical operators, control flow</a:t>
+            </a:r>
+            <a:endParaRPr lang="en-GB" dirty="0"/>
           </a:p>
         </p:txBody>
       </p:sp>
@@ -10043,150 +10488,6 @@
           <a:lstStyle/>
           <a:p>
             <a:r>
-              <a:rPr lang="en-US" dirty="0" smtClean="0"/>
-              <a:t>What is </a:t>
-            </a:r>
-            <a:r>
-              <a:rPr lang="en-US" dirty="0" err="1" smtClean="0"/>
-              <a:t>Modelica</a:t>
-            </a:r>
-            <a:r>
-              <a:rPr lang="en-US" dirty="0" smtClean="0"/>
-              <a:t> ? </a:t>
-            </a:r>
-          </a:p>
-          <a:p>
-            <a:r>
-              <a:rPr lang="en-US" dirty="0" smtClean="0"/>
-              <a:t>Syntax, language concepts and model structuring</a:t>
-            </a:r>
-          </a:p>
-          <a:p>
-            <a:r>
-              <a:rPr lang="en-US" dirty="0" err="1" smtClean="0"/>
-              <a:t>Modelica</a:t>
-            </a:r>
-            <a:r>
-              <a:rPr lang="en-US" dirty="0" smtClean="0"/>
-              <a:t> tools</a:t>
-            </a:r>
-          </a:p>
-          <a:p>
-            <a:r>
-              <a:rPr lang="en-US" dirty="0" smtClean="0"/>
-              <a:t>Use of IDEAS library</a:t>
-            </a:r>
-          </a:p>
-          <a:p>
-            <a:r>
-              <a:rPr lang="en-US" dirty="0" smtClean="0"/>
-              <a:t>Getting started (tutorials, reference docs, libraries, software implementations, ...)</a:t>
-            </a:r>
-          </a:p>
-          <a:p>
-            <a:endParaRPr lang="en-US" dirty="0" smtClean="0"/>
-          </a:p>
-          <a:p>
-            <a:r>
-              <a:rPr lang="en-US" dirty="0" smtClean="0">
-                <a:sym typeface="Wingdings" panose="05000000000000000000" pitchFamily="2" charset="2"/>
-              </a:rPr>
-              <a:t></a:t>
-            </a:r>
-            <a:r>
-              <a:rPr lang="en-US" dirty="0" smtClean="0"/>
-              <a:t> To get you started with </a:t>
-            </a:r>
-            <a:r>
-              <a:rPr lang="en-US" dirty="0" err="1" smtClean="0"/>
-              <a:t>Modelica</a:t>
-            </a:r>
-            <a:r>
-              <a:rPr lang="en-US" dirty="0" smtClean="0"/>
-              <a:t>! </a:t>
-            </a:r>
-          </a:p>
-          <a:p>
-            <a:endParaRPr lang="nl-BE" dirty="0"/>
-          </a:p>
-        </p:txBody>
-      </p:sp>
-    </p:spTree>
-    <p:extLst>
-      <p:ext uri="{BB962C8B-B14F-4D97-AF65-F5344CB8AC3E}">
-        <p14:creationId xmlns:p14="http://schemas.microsoft.com/office/powerpoint/2010/main" val="164379939"/>
-      </p:ext>
-    </p:extLst>
-  </p:cSld>
-  <p:clrMapOvr>
-    <a:masterClrMapping/>
-  </p:clrMapOvr>
-  <p:timing>
-    <p:tnLst>
-      <p:par>
-        <p:cTn id="1" dur="indefinite" restart="never" nodeType="tmRoot"/>
-      </p:par>
-    </p:tnLst>
-  </p:timing>
-</p:sld>
-</file>
-
-<file path=ppt/slides/slide20.xml><?xml version="1.0" encoding="utf-8"?>
-<p:sld xmlns:a="http://schemas.openxmlformats.org/drawingml/2006/main" xmlns:r="http://schemas.openxmlformats.org/officeDocument/2006/relationships" xmlns:p="http://schemas.openxmlformats.org/presentationml/2006/main">
-  <p:cSld>
-    <p:spTree>
-      <p:nvGrpSpPr>
-        <p:cNvPr id="1" name=""/>
-        <p:cNvGrpSpPr/>
-        <p:nvPr/>
-      </p:nvGrpSpPr>
-      <p:grpSpPr>
-        <a:xfrm>
-          <a:off x="0" y="0"/>
-          <a:ext cx="0" cy="0"/>
-          <a:chOff x="0" y="0"/>
-          <a:chExt cx="0" cy="0"/>
-        </a:xfrm>
-      </p:grpSpPr>
-      <p:sp>
-        <p:nvSpPr>
-          <p:cNvPr id="2" name="Title 1"/>
-          <p:cNvSpPr>
-            <a:spLocks noGrp="1"/>
-          </p:cNvSpPr>
-          <p:nvPr>
-            <p:ph type="title"/>
-          </p:nvPr>
-        </p:nvSpPr>
-        <p:spPr/>
-        <p:txBody>
-          <a:bodyPr/>
-          <a:lstStyle/>
-          <a:p>
-            <a:r>
-              <a:rPr lang="en-GB" dirty="0" smtClean="0"/>
-              <a:t>Logical operators, control flow</a:t>
-            </a:r>
-            <a:endParaRPr lang="en-GB" dirty="0"/>
-          </a:p>
-        </p:txBody>
-      </p:sp>
-      <p:sp>
-        <p:nvSpPr>
-          <p:cNvPr id="3" name="Content Placeholder 2"/>
-          <p:cNvSpPr>
-            <a:spLocks noGrp="1"/>
-          </p:cNvSpPr>
-          <p:nvPr>
-            <p:ph idx="1"/>
-          </p:nvPr>
-        </p:nvSpPr>
-        <p:spPr/>
-        <p:txBody>
-          <a:bodyPr/>
-          <a:lstStyle/>
-          <a:p>
-            <a:r>
               <a:rPr lang="en-GB" dirty="0" smtClean="0"/>
               <a:t>Logical</a:t>
             </a:r>
@@ -10194,7 +10495,9 @@
           <a:p>
             <a:pPr lvl="1"/>
             <a:r>
-              <a:rPr lang="en-GB" dirty="0" smtClean="0"/>
+              <a:rPr lang="en-GB" dirty="0" smtClean="0">
+                <a:latin typeface="Lucida Console" panose="020B0609040504020204" pitchFamily="49" charset="0"/>
+              </a:rPr>
               <a:t>and, or, not</a:t>
             </a:r>
           </a:p>
@@ -10207,15 +10510,33 @@
           <a:p>
             <a:pPr lvl="1"/>
             <a:r>
-              <a:rPr lang="en-GB" dirty="0" smtClean="0"/>
-              <a:t>If, </a:t>
-            </a:r>
-            <a:r>
-              <a:rPr lang="en-GB" dirty="0" err="1" smtClean="0"/>
+              <a:rPr lang="en-GB" dirty="0">
+                <a:latin typeface="Lucida Console" panose="020B0609040504020204" pitchFamily="49" charset="0"/>
+              </a:rPr>
+              <a:t>i</a:t>
+            </a:r>
+            <a:r>
+              <a:rPr lang="en-GB" dirty="0" smtClean="0">
+                <a:latin typeface="Lucida Console" panose="020B0609040504020204" pitchFamily="49" charset="0"/>
+              </a:rPr>
+              <a:t>f</a:t>
+            </a:r>
+            <a:r>
+              <a:rPr lang="en-GB" dirty="0" smtClean="0">
+                <a:latin typeface="Lucida Console" panose="020B0609040504020204" pitchFamily="49" charset="0"/>
+              </a:rPr>
+              <a:t>, </a:t>
+            </a:r>
+            <a:r>
+              <a:rPr lang="en-GB" dirty="0" err="1" smtClean="0">
+                <a:latin typeface="Lucida Console" panose="020B0609040504020204" pitchFamily="49" charset="0"/>
+              </a:rPr>
               <a:t>elseif</a:t>
             </a:r>
             <a:r>
-              <a:rPr lang="en-GB" dirty="0" smtClean="0"/>
+              <a:rPr lang="en-GB" dirty="0" smtClean="0">
+                <a:latin typeface="Lucida Console" panose="020B0609040504020204" pitchFamily="49" charset="0"/>
+              </a:rPr>
               <a:t>, else</a:t>
             </a:r>
           </a:p>
@@ -10232,9 +10553,20 @@
           <a:p>
             <a:pPr lvl="1"/>
             <a:r>
-              <a:rPr lang="en-GB" dirty="0" smtClean="0"/>
-              <a:t>For</a:t>
-            </a:r>
+              <a:rPr lang="en-GB" dirty="0">
+                <a:latin typeface="Lucida Console" panose="020B0609040504020204" pitchFamily="49" charset="0"/>
+              </a:rPr>
+              <a:t>f</a:t>
+            </a:r>
+            <a:r>
+              <a:rPr lang="en-GB" dirty="0" smtClean="0">
+                <a:latin typeface="Lucida Console" panose="020B0609040504020204" pitchFamily="49" charset="0"/>
+              </a:rPr>
+              <a:t>or</a:t>
+            </a:r>
+            <a:endParaRPr lang="en-GB" dirty="0" smtClean="0">
+              <a:latin typeface="Lucida Console" panose="020B0609040504020204" pitchFamily="49" charset="0"/>
+            </a:endParaRPr>
           </a:p>
           <a:p>
             <a:r>
@@ -10245,8 +10577,14 @@
           <a:p>
             <a:pPr lvl="1"/>
             <a:r>
+              <a:rPr lang="en-GB" dirty="0" smtClean="0">
+                <a:latin typeface="Lucida Console" panose="020B0609040504020204" pitchFamily="49" charset="0"/>
+              </a:rPr>
+              <a:t>&gt;, &lt;, &lt;&gt;, &gt;=</a:t>
+            </a:r>
+            <a:r>
               <a:rPr lang="en-GB" dirty="0" smtClean="0"/>
-              <a:t>&gt;, &lt;, &lt;&gt;, &gt;=,…</a:t>
+              <a:t>,…</a:t>
             </a:r>
           </a:p>
         </p:txBody>
@@ -10267,7 +10605,7 @@
         </p:blipFill>
         <p:spPr>
           <a:xfrm>
-            <a:off x="4359920" y="2513856"/>
+            <a:off x="5569510" y="2513856"/>
             <a:ext cx="1899761" cy="1735584"/>
           </a:xfrm>
           <a:prstGeom prst="rect">
@@ -10291,7 +10629,7 @@
         </p:blipFill>
         <p:spPr>
           <a:xfrm>
-            <a:off x="4359920" y="4458072"/>
+            <a:off x="5569510" y="4458072"/>
             <a:ext cx="2376264" cy="447146"/>
           </a:xfrm>
           <a:prstGeom prst="rect">
@@ -10319,7 +10657,7 @@
 </p:sld>
 </file>
 
-<file path=ppt/slides/slide21.xml><?xml version="1.0" encoding="utf-8"?>
+<file path=ppt/slides/slide23.xml><?xml version="1.0" encoding="utf-8"?>
 <p:sld xmlns:a="http://schemas.openxmlformats.org/drawingml/2006/main" xmlns:r="http://schemas.openxmlformats.org/officeDocument/2006/relationships" xmlns:p="http://schemas.openxmlformats.org/presentationml/2006/main">
   <p:cSld>
     <p:spTree>
@@ -11538,7 +11876,7 @@
 </p:sld>
 </file>
 
-<file path=ppt/slides/slide22.xml><?xml version="1.0" encoding="utf-8"?>
+<file path=ppt/slides/slide24.xml><?xml version="1.0" encoding="utf-8"?>
 <p:sld xmlns:a="http://schemas.openxmlformats.org/drawingml/2006/main" xmlns:r="http://schemas.openxmlformats.org/officeDocument/2006/relationships" xmlns:p="http://schemas.openxmlformats.org/presentationml/2006/main">
   <p:cSld>
     <p:spTree>
@@ -11608,7 +11946,7 @@
             <a:pPr lvl="1"/>
             <a:r>
               <a:rPr lang="en-GB" dirty="0" smtClean="0">
-                <a:latin typeface="Monaco"/>
+                <a:latin typeface="Lucida Console" panose="020B0609040504020204" pitchFamily="49" charset="0"/>
                 <a:cs typeface="Monaco"/>
               </a:rPr>
               <a:t>“this is a comment”</a:t>
@@ -11637,7 +11975,7 @@
             <a:pPr lvl="1"/>
             <a:r>
               <a:rPr lang="en-GB" dirty="0" smtClean="0">
-                <a:latin typeface="Monaco"/>
+                <a:latin typeface="Lucida Console" panose="020B0609040504020204" pitchFamily="49" charset="0"/>
                 <a:cs typeface="Monaco"/>
               </a:rPr>
               <a:t>// This is a comment on one line</a:t>
@@ -11647,52 +11985,52 @@
             <a:pPr lvl="1"/>
             <a:r>
               <a:rPr lang="en-GB" dirty="0" smtClean="0">
-                <a:latin typeface="Monaco"/>
+                <a:latin typeface="Lucida Console" panose="020B0609040504020204" pitchFamily="49" charset="0"/>
                 <a:cs typeface="Monaco"/>
               </a:rPr>
               <a:t>/*</a:t>
             </a:r>
             <a:br>
               <a:rPr lang="en-GB" dirty="0" smtClean="0">
-                <a:latin typeface="Monaco"/>
+                <a:latin typeface="Lucida Console" panose="020B0609040504020204" pitchFamily="49" charset="0"/>
                 <a:cs typeface="Monaco"/>
               </a:rPr>
             </a:br>
             <a:r>
               <a:rPr lang="en-GB" dirty="0" smtClean="0">
-                <a:latin typeface="Monaco"/>
+                <a:latin typeface="Lucida Console" panose="020B0609040504020204" pitchFamily="49" charset="0"/>
                 <a:cs typeface="Monaco"/>
               </a:rPr>
               <a:t>This is a comment</a:t>
             </a:r>
             <a:br>
               <a:rPr lang="en-GB" dirty="0" smtClean="0">
-                <a:latin typeface="Monaco"/>
+                <a:latin typeface="Lucida Console" panose="020B0609040504020204" pitchFamily="49" charset="0"/>
                 <a:cs typeface="Monaco"/>
               </a:rPr>
             </a:br>
             <a:r>
               <a:rPr lang="en-GB" dirty="0" smtClean="0">
-                <a:latin typeface="Monaco"/>
+                <a:latin typeface="Lucida Console" panose="020B0609040504020204" pitchFamily="49" charset="0"/>
                 <a:cs typeface="Monaco"/>
               </a:rPr>
               <a:t>over multiple lines</a:t>
             </a:r>
             <a:br>
               <a:rPr lang="en-GB" dirty="0" smtClean="0">
-                <a:latin typeface="Monaco"/>
+                <a:latin typeface="Lucida Console" panose="020B0609040504020204" pitchFamily="49" charset="0"/>
                 <a:cs typeface="Monaco"/>
               </a:rPr>
             </a:br>
             <a:r>
               <a:rPr lang="en-GB" dirty="0" smtClean="0">
-                <a:latin typeface="Monaco"/>
+                <a:latin typeface="Lucida Console" panose="020B0609040504020204" pitchFamily="49" charset="0"/>
                 <a:cs typeface="Monaco"/>
               </a:rPr>
               <a:t>*/</a:t>
             </a:r>
             <a:endParaRPr lang="en-GB" dirty="0">
-              <a:latin typeface="Monaco"/>
+              <a:latin typeface="Lucida Console" panose="020B0609040504020204" pitchFamily="49" charset="0"/>
               <a:cs typeface="Monaco"/>
             </a:endParaRPr>
           </a:p>
@@ -11718,7 +12056,7 @@
 </p:sld>
 </file>
 
-<file path=ppt/slides/slide23.xml><?xml version="1.0" encoding="utf-8"?>
+<file path=ppt/slides/slide25.xml><?xml version="1.0" encoding="utf-8"?>
 <p:sld xmlns:a="http://schemas.openxmlformats.org/drawingml/2006/main" xmlns:r="http://schemas.openxmlformats.org/officeDocument/2006/relationships" xmlns:p="http://schemas.openxmlformats.org/presentationml/2006/main">
   <p:cSld>
     <p:spTree>
@@ -12022,7 +12360,7 @@
 </p:sld>
 </file>
 
-<file path=ppt/slides/slide24.xml><?xml version="1.0" encoding="utf-8"?>
+<file path=ppt/slides/slide26.xml><?xml version="1.0" encoding="utf-8"?>
 <p:sld xmlns:a="http://schemas.openxmlformats.org/drawingml/2006/main" xmlns:r="http://schemas.openxmlformats.org/officeDocument/2006/relationships" xmlns:p="http://schemas.openxmlformats.org/presentationml/2006/main">
   <p:cSld>
     <p:spTree>
@@ -12100,25 +12438,13 @@
             <a:pPr lvl="1"/>
             <a:r>
               <a:rPr lang="en-GB" dirty="0" smtClean="0"/>
-              <a:t>Heat flow (heat flow rate, temperature)</a:t>
-            </a:r>
-          </a:p>
-          <a:p>
-            <a:r>
-              <a:rPr lang="en-GB" dirty="0" smtClean="0">
-                <a:latin typeface="Monaco" panose="020B0509030404040204" pitchFamily="49" charset="0"/>
-              </a:rPr>
-              <a:t>flow </a:t>
-            </a:r>
-            <a:r>
-              <a:rPr lang="en-GB" dirty="0" smtClean="0">
-                <a:latin typeface="+mj-lt"/>
-              </a:rPr>
-              <a:t>variable, potential variable</a:t>
-            </a:r>
-            <a:endParaRPr lang="en-GB" dirty="0">
-              <a:latin typeface="+mj-lt"/>
-            </a:endParaRPr>
+              <a:t>Heat flow (heat flow rate, temperature</a:t>
+            </a:r>
+            <a:r>
+              <a:rPr lang="en-GB" dirty="0" smtClean="0"/>
+              <a:t>)</a:t>
+            </a:r>
+            <a:endParaRPr lang="en-GB" dirty="0" smtClean="0"/>
           </a:p>
         </p:txBody>
       </p:sp>
@@ -12410,9 +12736,135 @@
           </a:p>
         </p:txBody>
       </p:sp>
+    </p:spTree>
+    <p:extLst>
+      <p:ext uri="{BB962C8B-B14F-4D97-AF65-F5344CB8AC3E}">
+        <p14:creationId xmlns:p14="http://schemas.microsoft.com/office/powerpoint/2010/main" val="1273494810"/>
+      </p:ext>
+    </p:extLst>
+  </p:cSld>
+  <p:clrMapOvr>
+    <a:masterClrMapping/>
+  </p:clrMapOvr>
+  <p:timing>
+    <p:tnLst>
+      <p:par>
+        <p:cTn id="1" dur="indefinite" restart="never" nodeType="tmRoot"/>
+      </p:par>
+    </p:tnLst>
+  </p:timing>
+</p:sld>
+</file>
+
+<file path=ppt/slides/slide27.xml><?xml version="1.0" encoding="utf-8"?>
+<p:sld xmlns:a="http://schemas.openxmlformats.org/drawingml/2006/main" xmlns:r="http://schemas.openxmlformats.org/officeDocument/2006/relationships" xmlns:p="http://schemas.openxmlformats.org/presentationml/2006/main">
+  <p:cSld>
+    <p:spTree>
+      <p:nvGrpSpPr>
+        <p:cNvPr id="1" name=""/>
+        <p:cNvGrpSpPr/>
+        <p:nvPr/>
+      </p:nvGrpSpPr>
+      <p:grpSpPr>
+        <a:xfrm>
+          <a:off x="0" y="0"/>
+          <a:ext cx="0" cy="0"/>
+          <a:chOff x="0" y="0"/>
+          <a:chExt cx="0" cy="0"/>
+        </a:xfrm>
+      </p:grpSpPr>
+      <p:sp>
+        <p:nvSpPr>
+          <p:cNvPr id="2" name="Title 1"/>
+          <p:cNvSpPr>
+            <a:spLocks noGrp="1"/>
+          </p:cNvSpPr>
+          <p:nvPr>
+            <p:ph type="title"/>
+          </p:nvPr>
+        </p:nvSpPr>
+        <p:spPr/>
+        <p:txBody>
+          <a:bodyPr/>
+          <a:lstStyle/>
+          <a:p>
+            <a:r>
+              <a:rPr lang="en-US" dirty="0" smtClean="0"/>
+              <a:t>Connectors</a:t>
+            </a:r>
+            <a:endParaRPr lang="en-US" dirty="0"/>
+          </a:p>
+        </p:txBody>
+      </p:sp>
+      <p:sp>
+        <p:nvSpPr>
+          <p:cNvPr id="3" name="Content Placeholder 2"/>
+          <p:cNvSpPr>
+            <a:spLocks noGrp="1"/>
+          </p:cNvSpPr>
+          <p:nvPr>
+            <p:ph idx="1"/>
+          </p:nvPr>
+        </p:nvSpPr>
+        <p:spPr/>
+        <p:txBody>
+          <a:bodyPr/>
+          <a:lstStyle/>
+          <a:p>
+            <a:r>
+              <a:rPr lang="en-GB" dirty="0">
+                <a:latin typeface="Lucida Console" panose="020B0609040504020204" pitchFamily="49" charset="0"/>
+              </a:rPr>
+              <a:t>flow</a:t>
+            </a:r>
+            <a:r>
+              <a:rPr lang="en-GB" dirty="0">
+                <a:latin typeface="Monaco" panose="020B0509030404040204" pitchFamily="49" charset="0"/>
+              </a:rPr>
+              <a:t> </a:t>
+            </a:r>
+            <a:r>
+              <a:rPr lang="en-GB" dirty="0"/>
+              <a:t>variable, potential </a:t>
+            </a:r>
+            <a:r>
+              <a:rPr lang="en-GB" dirty="0" smtClean="0"/>
+              <a:t>variable</a:t>
+            </a:r>
+          </a:p>
+          <a:p>
+            <a:pPr lvl="1"/>
+            <a:r>
+              <a:rPr lang="en-GB" dirty="0" smtClean="0"/>
+              <a:t>Potential: voltage, pressure, temperature…</a:t>
+            </a:r>
+          </a:p>
+          <a:p>
+            <a:pPr lvl="1"/>
+            <a:r>
+              <a:rPr lang="en-GB" dirty="0" smtClean="0"/>
+              <a:t>Flow: current, mass/volume flow, heat flow…</a:t>
+            </a:r>
+          </a:p>
+          <a:p>
+            <a:r>
+              <a:rPr lang="en-GB" b="1" dirty="0" smtClean="0"/>
+              <a:t>Example:</a:t>
+            </a:r>
+            <a:r>
+              <a:rPr lang="en-GB" dirty="0" smtClean="0"/>
+              <a:t> Electrical model</a:t>
+            </a:r>
+            <a:endParaRPr lang="en-GB" b="1" dirty="0"/>
+          </a:p>
+          <a:p>
+            <a:endParaRPr lang="en-US" dirty="0"/>
+          </a:p>
+        </p:txBody>
+      </p:sp>
       <p:pic>
         <p:nvPicPr>
-          <p:cNvPr id="3074" name="Picture 2"/>
+          <p:cNvPr id="4" name="Picture 2"/>
           <p:cNvPicPr>
             <a:picLocks noChangeAspect="1" noChangeArrowheads="1"/>
           </p:cNvPicPr>
@@ -12466,7 +12918,7 @@
       </p:pic>
       <p:sp>
         <p:nvSpPr>
-          <p:cNvPr id="11" name="TextBox 2"/>
+          <p:cNvPr id="5" name="TextBox 2"/>
           <p:cNvSpPr txBox="1">
             <a:spLocks noChangeArrowheads="1"/>
           </p:cNvSpPr>
@@ -12710,24 +13162,17 @@
     </p:spTree>
     <p:extLst>
       <p:ext uri="{BB962C8B-B14F-4D97-AF65-F5344CB8AC3E}">
-        <p14:creationId xmlns:p14="http://schemas.microsoft.com/office/powerpoint/2010/main" val="1273494810"/>
+        <p14:creationId xmlns:p14="http://schemas.microsoft.com/office/powerpoint/2010/main" val="3646462091"/>
       </p:ext>
     </p:extLst>
   </p:cSld>
   <p:clrMapOvr>
     <a:masterClrMapping/>
   </p:clrMapOvr>
-  <p:timing>
-    <p:tnLst>
-      <p:par>
-        <p:cTn id="1" dur="indefinite" restart="never" nodeType="tmRoot"/>
-      </p:par>
-    </p:tnLst>
-  </p:timing>
 </p:sld>
 </file>
 
-<file path=ppt/slides/slide25.xml><?xml version="1.0" encoding="utf-8"?>
+<file path=ppt/slides/slide28.xml><?xml version="1.0" encoding="utf-8"?>
 <p:sld xmlns:a="http://schemas.openxmlformats.org/drawingml/2006/main" xmlns:r="http://schemas.openxmlformats.org/officeDocument/2006/relationships" xmlns:p="http://schemas.openxmlformats.org/presentationml/2006/main">
   <p:cSld>
     <p:spTree>
@@ -12944,7 +13389,7 @@
 </p:sld>
 </file>
 
-<file path=ppt/slides/slide26.xml><?xml version="1.0" encoding="utf-8"?>
+<file path=ppt/slides/slide29.xml><?xml version="1.0" encoding="utf-8"?>
 <p:sld xmlns:a="http://schemas.openxmlformats.org/drawingml/2006/main" xmlns:r="http://schemas.openxmlformats.org/officeDocument/2006/relationships" xmlns:p="http://schemas.openxmlformats.org/presentationml/2006/main">
   <p:cSld>
     <p:spTree>
@@ -13023,442 +13468,6 @@
   <p:clrMapOvr>
     <a:masterClrMapping/>
   </p:clrMapOvr>
-</p:sld>
-</file>
-
-<file path=ppt/slides/slide27.xml><?xml version="1.0" encoding="utf-8"?>
-<p:sld xmlns:a="http://schemas.openxmlformats.org/drawingml/2006/main" xmlns:r="http://schemas.openxmlformats.org/officeDocument/2006/relationships" xmlns:p="http://schemas.openxmlformats.org/presentationml/2006/main">
-  <p:cSld>
-    <p:spTree>
-      <p:nvGrpSpPr>
-        <p:cNvPr id="1" name=""/>
-        <p:cNvGrpSpPr/>
-        <p:nvPr/>
-      </p:nvGrpSpPr>
-      <p:grpSpPr>
-        <a:xfrm>
-          <a:off x="0" y="0"/>
-          <a:ext cx="0" cy="0"/>
-          <a:chOff x="0" y="0"/>
-          <a:chExt cx="0" cy="0"/>
-        </a:xfrm>
-      </p:grpSpPr>
-      <p:sp>
-        <p:nvSpPr>
-          <p:cNvPr id="2" name="Title 1"/>
-          <p:cNvSpPr>
-            <a:spLocks noGrp="1"/>
-          </p:cNvSpPr>
-          <p:nvPr>
-            <p:ph type="title"/>
-          </p:nvPr>
-        </p:nvSpPr>
-        <p:spPr/>
-        <p:txBody>
-          <a:bodyPr>
-            <a:normAutofit fontScale="90000"/>
-          </a:bodyPr>
-          <a:lstStyle/>
-          <a:p>
-            <a:r>
-              <a:rPr lang="en-US" dirty="0" err="1" smtClean="0"/>
-              <a:t>ToDo</a:t>
-            </a:r>
-            <a:r>
-              <a:rPr lang="en-US" dirty="0" smtClean="0"/>
-              <a:t> BRAM: add slides on homework example and link to inheritance</a:t>
-            </a:r>
-            <a:endParaRPr lang="en-US" dirty="0"/>
-          </a:p>
-        </p:txBody>
-      </p:sp>
-      <p:sp>
-        <p:nvSpPr>
-          <p:cNvPr id="3" name="Content Placeholder 2"/>
-          <p:cNvSpPr>
-            <a:spLocks noGrp="1"/>
-          </p:cNvSpPr>
-          <p:nvPr>
-            <p:ph idx="1"/>
-          </p:nvPr>
-        </p:nvSpPr>
-        <p:spPr/>
-        <p:txBody>
-          <a:bodyPr/>
-          <a:lstStyle/>
-          <a:p>
-            <a:endParaRPr lang="en-US"/>
-          </a:p>
-        </p:txBody>
-      </p:sp>
-    </p:spTree>
-    <p:extLst>
-      <p:ext uri="{BB962C8B-B14F-4D97-AF65-F5344CB8AC3E}">
-        <p14:creationId xmlns:p14="http://schemas.microsoft.com/office/powerpoint/2010/main" val="2938485761"/>
-      </p:ext>
-    </p:extLst>
-  </p:cSld>
-  <p:clrMapOvr>
-    <a:masterClrMapping/>
-  </p:clrMapOvr>
-</p:sld>
-</file>
-
-<file path=ppt/slides/slide28.xml><?xml version="1.0" encoding="utf-8"?>
-<p:sld xmlns:a="http://schemas.openxmlformats.org/drawingml/2006/main" xmlns:r="http://schemas.openxmlformats.org/officeDocument/2006/relationships" xmlns:p="http://schemas.openxmlformats.org/presentationml/2006/main">
-  <p:cSld>
-    <p:spTree>
-      <p:nvGrpSpPr>
-        <p:cNvPr id="1" name=""/>
-        <p:cNvGrpSpPr/>
-        <p:nvPr/>
-      </p:nvGrpSpPr>
-      <p:grpSpPr>
-        <a:xfrm>
-          <a:off x="0" y="0"/>
-          <a:ext cx="0" cy="0"/>
-          <a:chOff x="0" y="0"/>
-          <a:chExt cx="0" cy="0"/>
-        </a:xfrm>
-      </p:grpSpPr>
-      <p:sp>
-        <p:nvSpPr>
-          <p:cNvPr id="2" name="Title 1"/>
-          <p:cNvSpPr>
-            <a:spLocks noGrp="1"/>
-          </p:cNvSpPr>
-          <p:nvPr>
-            <p:ph type="title"/>
-          </p:nvPr>
-        </p:nvSpPr>
-        <p:spPr/>
-        <p:txBody>
-          <a:bodyPr/>
-          <a:lstStyle/>
-          <a:p>
-            <a:r>
-              <a:rPr lang="nl-NL" dirty="0" err="1" smtClean="0"/>
-              <a:t>Inheritance</a:t>
-            </a:r>
-            <a:endParaRPr lang="nl-BE" dirty="0"/>
-          </a:p>
-        </p:txBody>
-      </p:sp>
-      <p:sp>
-        <p:nvSpPr>
-          <p:cNvPr id="3" name="Content Placeholder 2"/>
-          <p:cNvSpPr>
-            <a:spLocks noGrp="1"/>
-          </p:cNvSpPr>
-          <p:nvPr>
-            <p:ph idx="1"/>
-          </p:nvPr>
-        </p:nvSpPr>
-        <p:spPr/>
-        <p:txBody>
-          <a:bodyPr/>
-          <a:lstStyle/>
-          <a:p>
-            <a:r>
-              <a:rPr lang="nl-NL" dirty="0" smtClean="0"/>
-              <a:t>Model </a:t>
-            </a:r>
-            <a:r>
-              <a:rPr lang="nl-NL" i="1" dirty="0" err="1" smtClean="0"/>
-              <a:t>inherits</a:t>
-            </a:r>
-            <a:r>
-              <a:rPr lang="nl-NL" i="1" dirty="0" smtClean="0"/>
-              <a:t> </a:t>
-            </a:r>
-            <a:r>
-              <a:rPr lang="nl-NL" dirty="0" err="1" smtClean="0"/>
-              <a:t>from</a:t>
-            </a:r>
-            <a:r>
-              <a:rPr lang="nl-NL" dirty="0" smtClean="0"/>
-              <a:t> </a:t>
-            </a:r>
-            <a:r>
-              <a:rPr lang="nl-NL" dirty="0" err="1" smtClean="0"/>
-              <a:t>other</a:t>
-            </a:r>
-            <a:r>
-              <a:rPr lang="nl-NL" dirty="0" smtClean="0"/>
-              <a:t> model</a:t>
-            </a:r>
-          </a:p>
-          <a:p>
-            <a:pPr lvl="1"/>
-            <a:r>
-              <a:rPr lang="nl-NL" i="1" dirty="0" smtClean="0"/>
-              <a:t>Variables, parameters, </a:t>
-            </a:r>
-            <a:r>
-              <a:rPr lang="nl-NL" i="1" dirty="0" err="1" smtClean="0"/>
-              <a:t>equations</a:t>
-            </a:r>
-            <a:endParaRPr lang="nl-NL" i="1" dirty="0" smtClean="0"/>
-          </a:p>
-          <a:p>
-            <a:r>
-              <a:rPr lang="nl-NL" dirty="0" err="1" smtClean="0">
-                <a:latin typeface="Monaco" panose="020B0509030404040204" pitchFamily="49" charset="0"/>
-              </a:rPr>
-              <a:t>partial</a:t>
-            </a:r>
-            <a:r>
-              <a:rPr lang="nl-NL" dirty="0" smtClean="0">
-                <a:latin typeface="Monaco" panose="020B0509030404040204" pitchFamily="49" charset="0"/>
-              </a:rPr>
-              <a:t> model</a:t>
-            </a:r>
-          </a:p>
-          <a:p>
-            <a:r>
-              <a:rPr lang="nl-NL" dirty="0" smtClean="0">
-                <a:latin typeface="+mj-lt"/>
-              </a:rPr>
-              <a:t>Code </a:t>
-            </a:r>
-            <a:r>
-              <a:rPr lang="nl-NL" dirty="0" err="1" smtClean="0">
-                <a:latin typeface="+mj-lt"/>
-              </a:rPr>
-              <a:t>can</a:t>
-            </a:r>
-            <a:r>
-              <a:rPr lang="nl-NL" dirty="0" smtClean="0">
-                <a:latin typeface="+mj-lt"/>
-              </a:rPr>
-              <a:t> </a:t>
-            </a:r>
-            <a:r>
-              <a:rPr lang="nl-NL" dirty="0" err="1" smtClean="0">
-                <a:latin typeface="+mj-lt"/>
-              </a:rPr>
-              <a:t>be</a:t>
-            </a:r>
-            <a:r>
-              <a:rPr lang="nl-NL" dirty="0" smtClean="0">
-                <a:latin typeface="+mj-lt"/>
-              </a:rPr>
-              <a:t> </a:t>
-            </a:r>
-            <a:r>
-              <a:rPr lang="nl-NL" dirty="0" err="1" smtClean="0">
-                <a:latin typeface="+mj-lt"/>
-              </a:rPr>
-              <a:t>managed</a:t>
-            </a:r>
-            <a:r>
-              <a:rPr lang="nl-NL" dirty="0" smtClean="0">
-                <a:latin typeface="+mj-lt"/>
-              </a:rPr>
-              <a:t> more </a:t>
-            </a:r>
-            <a:r>
-              <a:rPr lang="nl-NL" dirty="0" err="1" smtClean="0">
-                <a:latin typeface="+mj-lt"/>
-              </a:rPr>
-              <a:t>easily</a:t>
-            </a:r>
-            <a:endParaRPr lang="nl-NL" dirty="0" smtClean="0">
-              <a:latin typeface="+mj-lt"/>
-            </a:endParaRPr>
-          </a:p>
-          <a:p>
-            <a:r>
-              <a:rPr lang="nl-NL" dirty="0" err="1" smtClean="0">
-                <a:latin typeface="+mj-lt"/>
-              </a:rPr>
-              <a:t>Example</a:t>
-            </a:r>
-            <a:endParaRPr lang="nl-NL" dirty="0" smtClean="0">
-              <a:latin typeface="+mj-lt"/>
-            </a:endParaRPr>
-          </a:p>
-          <a:p>
-            <a:pPr lvl="1"/>
-            <a:endParaRPr lang="nl-BE" dirty="0"/>
-          </a:p>
-        </p:txBody>
-      </p:sp>
-    </p:spTree>
-    <p:extLst>
-      <p:ext uri="{BB962C8B-B14F-4D97-AF65-F5344CB8AC3E}">
-        <p14:creationId xmlns:p14="http://schemas.microsoft.com/office/powerpoint/2010/main" val="1964542570"/>
-      </p:ext>
-    </p:extLst>
-  </p:cSld>
-  <p:clrMapOvr>
-    <a:masterClrMapping/>
-  </p:clrMapOvr>
-  <p:timing>
-    <p:tnLst>
-      <p:par>
-        <p:cTn id="1" dur="indefinite" restart="never" nodeType="tmRoot"/>
-      </p:par>
-    </p:tnLst>
-  </p:timing>
-</p:sld>
-</file>
-
-<file path=ppt/slides/slide29.xml><?xml version="1.0" encoding="utf-8"?>
-<p:sld xmlns:a="http://schemas.openxmlformats.org/drawingml/2006/main" xmlns:r="http://schemas.openxmlformats.org/officeDocument/2006/relationships" xmlns:p="http://schemas.openxmlformats.org/presentationml/2006/main">
-  <p:cSld>
-    <p:spTree>
-      <p:nvGrpSpPr>
-        <p:cNvPr id="1" name=""/>
-        <p:cNvGrpSpPr/>
-        <p:nvPr/>
-      </p:nvGrpSpPr>
-      <p:grpSpPr>
-        <a:xfrm>
-          <a:off x="0" y="0"/>
-          <a:ext cx="0" cy="0"/>
-          <a:chOff x="0" y="0"/>
-          <a:chExt cx="0" cy="0"/>
-        </a:xfrm>
-      </p:grpSpPr>
-      <p:sp>
-        <p:nvSpPr>
-          <p:cNvPr id="2" name="Title 1"/>
-          <p:cNvSpPr>
-            <a:spLocks noGrp="1"/>
-          </p:cNvSpPr>
-          <p:nvPr>
-            <p:ph type="title"/>
-          </p:nvPr>
-        </p:nvSpPr>
-        <p:spPr/>
-        <p:txBody>
-          <a:bodyPr/>
-          <a:lstStyle/>
-          <a:p>
-            <a:r>
-              <a:rPr lang="en-GB" dirty="0" smtClean="0"/>
-              <a:t>Interface with other programs</a:t>
-            </a:r>
-            <a:endParaRPr lang="en-GB" dirty="0"/>
-          </a:p>
-        </p:txBody>
-      </p:sp>
-      <p:sp>
-        <p:nvSpPr>
-          <p:cNvPr id="3" name="Content Placeholder 2"/>
-          <p:cNvSpPr>
-            <a:spLocks noGrp="1"/>
-          </p:cNvSpPr>
-          <p:nvPr>
-            <p:ph idx="1"/>
-          </p:nvPr>
-        </p:nvSpPr>
-        <p:spPr/>
-        <p:txBody>
-          <a:bodyPr/>
-          <a:lstStyle/>
-          <a:p>
-            <a:r>
-              <a:rPr lang="en-GB" dirty="0" smtClean="0"/>
-              <a:t>Scripting</a:t>
-            </a:r>
-          </a:p>
-          <a:p>
-            <a:pPr lvl="1"/>
-            <a:r>
-              <a:rPr lang="en-GB" dirty="0" smtClean="0"/>
-              <a:t>Parameter variation</a:t>
-            </a:r>
-          </a:p>
-          <a:p>
-            <a:pPr lvl="1"/>
-            <a:r>
-              <a:rPr lang="en-GB" dirty="0" smtClean="0"/>
-              <a:t>Parallel simulations</a:t>
-            </a:r>
-          </a:p>
-          <a:p>
-            <a:pPr lvl="1"/>
-            <a:r>
-              <a:rPr lang="en-GB" dirty="0" smtClean="0"/>
-              <a:t>Optimal control</a:t>
-            </a:r>
-          </a:p>
-          <a:p>
-            <a:r>
-              <a:rPr lang="en-GB" dirty="0" smtClean="0"/>
-              <a:t>Python scripts using </a:t>
-            </a:r>
-            <a:r>
-              <a:rPr lang="en-GB" i="1" dirty="0" err="1" smtClean="0"/>
-              <a:t>BuildingsPy</a:t>
-            </a:r>
-            <a:endParaRPr lang="en-GB" i="1" dirty="0" smtClean="0"/>
-          </a:p>
-          <a:p>
-            <a:pPr lvl="1"/>
-            <a:r>
-              <a:rPr lang="en-GB" dirty="0" smtClean="0"/>
-              <a:t>Nice for plotting</a:t>
-            </a:r>
-          </a:p>
-          <a:p>
-            <a:pPr lvl="1"/>
-            <a:r>
-              <a:rPr lang="en-GB" dirty="0">
-                <a:hlinkClick r:id="rId2"/>
-              </a:rPr>
-              <a:t>http://simulationresearch.lbl.gov/modelica/buildingspy</a:t>
-            </a:r>
-            <a:r>
-              <a:rPr lang="en-GB" dirty="0" smtClean="0">
-                <a:hlinkClick r:id="rId2"/>
-              </a:rPr>
-              <a:t>/</a:t>
-            </a:r>
-            <a:r>
-              <a:rPr lang="en-GB" dirty="0" smtClean="0"/>
-              <a:t> </a:t>
-            </a:r>
-          </a:p>
-          <a:p>
-            <a:r>
-              <a:rPr lang="en-GB" dirty="0" smtClean="0"/>
-              <a:t>MATLAB</a:t>
-            </a:r>
-          </a:p>
-          <a:p>
-            <a:pPr lvl="1"/>
-            <a:r>
-              <a:rPr lang="en-GB" dirty="0" smtClean="0"/>
-              <a:t>Built-in with </a:t>
-            </a:r>
-            <a:r>
-              <a:rPr lang="en-GB" dirty="0" err="1" smtClean="0"/>
-              <a:t>Dymola</a:t>
-            </a:r>
-            <a:endParaRPr lang="en-GB" dirty="0"/>
-          </a:p>
-        </p:txBody>
-      </p:sp>
-    </p:spTree>
-    <p:extLst>
-      <p:ext uri="{BB962C8B-B14F-4D97-AF65-F5344CB8AC3E}">
-        <p14:creationId xmlns:p14="http://schemas.microsoft.com/office/powerpoint/2010/main" val="4225182537"/>
-      </p:ext>
-    </p:extLst>
-  </p:cSld>
-  <p:clrMapOvr>
-    <a:masterClrMapping/>
-  </p:clrMapOvr>
-  <p:timing>
-    <p:tnLst>
-      <p:par>
-        <p:cTn id="1" dur="indefinite" restart="never" nodeType="tmRoot"/>
-      </p:par>
-    </p:tnLst>
-  </p:timing>
 </p:sld>
 </file>
 
@@ -14013,7 +14022,7 @@
       </p:grpSpPr>
       <p:sp>
         <p:nvSpPr>
-          <p:cNvPr id="13314" name="Title 1"/>
+          <p:cNvPr id="2" name="Title 1"/>
           <p:cNvSpPr>
             <a:spLocks noGrp="1"/>
           </p:cNvSpPr>
@@ -14023,24 +14032,31 @@
         </p:nvSpPr>
         <p:spPr/>
         <p:txBody>
-          <a:bodyPr/>
+          <a:bodyPr>
+            <a:normAutofit fontScale="90000"/>
+          </a:bodyPr>
           <a:lstStyle/>
           <a:p>
             <a:r>
-              <a:rPr lang="en-GB" altLang="nl-BE" smtClean="0"/>
-              <a:t>Websites</a:t>
-            </a:r>
-          </a:p>
-        </p:txBody>
-      </p:sp>
-      <p:sp>
-        <p:nvSpPr>
-          <p:cNvPr id="36867" name="Content Placeholder 2"/>
+              <a:rPr lang="en-US" dirty="0" err="1" smtClean="0"/>
+              <a:t>ToDo</a:t>
+            </a:r>
+            <a:r>
+              <a:rPr lang="en-US" dirty="0" smtClean="0"/>
+              <a:t> BRAM: add slides on homework example and link to inheritance</a:t>
+            </a:r>
+            <a:endParaRPr lang="en-US" dirty="0"/>
+          </a:p>
+        </p:txBody>
+      </p:sp>
+      <p:sp>
+        <p:nvSpPr>
+          <p:cNvPr id="3" name="Content Placeholder 2"/>
           <p:cNvSpPr>
             <a:spLocks noGrp="1"/>
           </p:cNvSpPr>
           <p:nvPr>
-            <p:ph sz="half" idx="1"/>
+            <p:ph idx="1"/>
           </p:nvPr>
         </p:nvSpPr>
         <p:spPr/>
@@ -14048,482 +14064,20 @@
           <a:bodyPr/>
           <a:lstStyle/>
           <a:p>
-            <a:pPr marL="0" indent="0">
-              <a:buFontTx/>
-              <a:buNone/>
-              <a:defRPr/>
-            </a:pPr>
-            <a:r>
-              <a:rPr lang="en-GB" altLang="nl-BE" sz="2000" b="1" dirty="0" smtClean="0"/>
-              <a:t>General</a:t>
-            </a:r>
-          </a:p>
-          <a:p>
-            <a:pPr>
-              <a:defRPr/>
-            </a:pPr>
-            <a:r>
-              <a:rPr lang="en-GB" altLang="nl-BE" sz="2000" dirty="0"/>
-              <a:t>www.modelica.org</a:t>
-            </a:r>
-          </a:p>
-          <a:p>
-            <a:pPr>
-              <a:defRPr/>
-            </a:pPr>
-            <a:r>
-              <a:rPr lang="en-GB" altLang="nl-BE" sz="2000" dirty="0" smtClean="0">
-                <a:hlinkClick r:id="rId2"/>
-              </a:rPr>
-              <a:t>www.openmodelica.org</a:t>
-            </a:r>
-            <a:endParaRPr lang="en-GB" altLang="nl-BE" sz="2000" dirty="0" smtClean="0"/>
-          </a:p>
-          <a:p>
-            <a:pPr>
-              <a:defRPr/>
-            </a:pPr>
-            <a:r>
-              <a:rPr lang="en-GB" altLang="nl-BE" sz="2000" dirty="0" smtClean="0">
-                <a:hlinkClick r:id="rId3"/>
-              </a:rPr>
-              <a:t>www.jmodelica.org</a:t>
-            </a:r>
-            <a:endParaRPr lang="en-GB" altLang="nl-BE" sz="2000" dirty="0" smtClean="0"/>
-          </a:p>
-          <a:p>
-            <a:pPr>
-              <a:defRPr/>
-            </a:pPr>
-            <a:r>
-              <a:rPr lang="en-GB" altLang="nl-BE" sz="2000" dirty="0" smtClean="0">
-                <a:hlinkClick r:id="rId4"/>
-              </a:rPr>
-              <a:t>http://www.claytex.com/tech-blog/</a:t>
-            </a:r>
-            <a:endParaRPr lang="en-GB" altLang="nl-BE" sz="2000" dirty="0" smtClean="0"/>
-          </a:p>
-          <a:p>
-            <a:pPr marL="0" indent="0">
-              <a:buFontTx/>
-              <a:buNone/>
-              <a:defRPr/>
-            </a:pPr>
-            <a:r>
-              <a:rPr lang="en-GB" altLang="nl-BE" sz="2000" b="1" dirty="0" err="1" smtClean="0"/>
-              <a:t>Modelica</a:t>
-            </a:r>
-            <a:r>
-              <a:rPr lang="en-GB" altLang="nl-BE" sz="2000" b="1" dirty="0" smtClean="0"/>
-              <a:t> language</a:t>
-            </a:r>
-          </a:p>
-          <a:p>
-            <a:pPr>
-              <a:defRPr/>
-            </a:pPr>
-            <a:r>
-              <a:rPr lang="en-GB" altLang="nl-BE" sz="2000" dirty="0" smtClean="0">
-                <a:hlinkClick r:id="rId5"/>
-              </a:rPr>
-              <a:t>http://modref.xogeny.com/</a:t>
-            </a:r>
-            <a:r>
-              <a:rPr lang="en-GB" altLang="nl-BE" sz="2000" dirty="0" smtClean="0"/>
-              <a:t> </a:t>
-            </a:r>
-            <a:r>
-              <a:rPr lang="en-GB" altLang="nl-BE" sz="2000" dirty="0" smtClean="0">
-                <a:solidFill>
-                  <a:srgbClr val="FF0000"/>
-                </a:solidFill>
-              </a:rPr>
-              <a:t>!!!</a:t>
-            </a:r>
-          </a:p>
-          <a:p>
-            <a:pPr>
-              <a:defRPr/>
-            </a:pPr>
-            <a:r>
-              <a:rPr lang="en-GB" altLang="nl-BE" sz="2000" dirty="0">
-                <a:hlinkClick r:id="rId6"/>
-              </a:rPr>
-              <a:t>http://book.xogeny.com</a:t>
-            </a:r>
-            <a:r>
-              <a:rPr lang="en-GB" altLang="nl-BE" sz="2000" dirty="0" smtClean="0">
-                <a:hlinkClick r:id="rId6"/>
-              </a:rPr>
-              <a:t>/</a:t>
-            </a:r>
-            <a:r>
-              <a:rPr lang="en-GB" altLang="nl-BE" sz="2000" dirty="0" smtClean="0"/>
-              <a:t> </a:t>
-            </a:r>
-            <a:r>
-              <a:rPr lang="en-GB" altLang="nl-BE" sz="2000" dirty="0" smtClean="0">
-                <a:solidFill>
-                  <a:srgbClr val="FF0000"/>
-                </a:solidFill>
-              </a:rPr>
-              <a:t>!!!</a:t>
-            </a:r>
-            <a:endParaRPr lang="en-GB" altLang="nl-BE" sz="2000" dirty="0" smtClean="0"/>
-          </a:p>
-          <a:p>
-            <a:pPr marL="0" indent="0">
-              <a:buFontTx/>
-              <a:buNone/>
-              <a:defRPr/>
-            </a:pPr>
-            <a:r>
-              <a:rPr lang="en-GB" altLang="nl-BE" sz="2000" b="1" dirty="0" smtClean="0"/>
-              <a:t>KUL </a:t>
-            </a:r>
-            <a:r>
-              <a:rPr lang="en-GB" altLang="nl-BE" sz="2000" b="1" dirty="0" err="1" smtClean="0"/>
-              <a:t>modeling</a:t>
-            </a:r>
-            <a:r>
-              <a:rPr lang="en-GB" altLang="nl-BE" sz="2000" b="1" dirty="0" smtClean="0"/>
-              <a:t> conventions</a:t>
-            </a:r>
-          </a:p>
-          <a:p>
-            <a:pPr>
-              <a:defRPr/>
-            </a:pPr>
-            <a:r>
-              <a:rPr lang="en-GB" altLang="nl-BE" sz="2000" dirty="0" smtClean="0">
-                <a:hlinkClick r:id="rId7"/>
-              </a:rPr>
-              <a:t>https://docs.google.com/document/d/1MaNKTdLz-YPpEEH3Eg12ECzG0ErK-rIK9IHd6gsBp7Q/edit?usp=sharing</a:t>
-            </a:r>
-            <a:endParaRPr lang="en-GB" altLang="nl-BE" sz="2000" dirty="0" smtClean="0"/>
-          </a:p>
-          <a:p>
-            <a:pPr>
-              <a:defRPr/>
-            </a:pPr>
-            <a:endParaRPr lang="en-GB" altLang="nl-BE" sz="2400" dirty="0" smtClean="0"/>
-          </a:p>
-          <a:p>
-            <a:pPr>
-              <a:defRPr/>
-            </a:pPr>
-            <a:endParaRPr lang="en-GB" altLang="nl-BE" sz="2400" dirty="0" smtClean="0"/>
-          </a:p>
-        </p:txBody>
-      </p:sp>
-      <p:sp>
-        <p:nvSpPr>
-          <p:cNvPr id="2" name="Content Placeholder 1"/>
-          <p:cNvSpPr>
-            <a:spLocks noGrp="1"/>
-          </p:cNvSpPr>
-          <p:nvPr>
-            <p:ph sz="half" idx="2"/>
-          </p:nvPr>
-        </p:nvSpPr>
-        <p:spPr/>
-        <p:txBody>
-          <a:bodyPr>
-            <a:normAutofit/>
-          </a:bodyPr>
-          <a:lstStyle/>
-          <a:p>
-            <a:pPr marL="0" indent="0">
-              <a:buFontTx/>
-              <a:buNone/>
-              <a:defRPr/>
-            </a:pPr>
-            <a:r>
-              <a:rPr lang="en-GB" altLang="nl-BE" sz="2000" b="1" dirty="0"/>
-              <a:t>Libraries:</a:t>
-            </a:r>
-          </a:p>
-          <a:p>
-            <a:pPr>
-              <a:defRPr/>
-            </a:pPr>
-            <a:r>
-              <a:rPr lang="en-GB" altLang="nl-BE" sz="2000" dirty="0">
-                <a:hlinkClick r:id="rId8"/>
-              </a:rPr>
-              <a:t>https://github.com/open-ideas</a:t>
-            </a:r>
-            <a:r>
-              <a:rPr lang="en-GB" altLang="nl-BE" sz="2000" dirty="0"/>
-              <a:t> --&gt; IDEAS + Crash Course</a:t>
-            </a:r>
-          </a:p>
-          <a:p>
-            <a:pPr>
-              <a:defRPr/>
-            </a:pPr>
-            <a:r>
-              <a:rPr lang="en-GB" altLang="nl-BE" sz="2000" dirty="0">
-                <a:hlinkClick r:id="rId9"/>
-              </a:rPr>
-              <a:t>https://simulationresearch.lbl.gov/modelica</a:t>
-            </a:r>
-            <a:r>
-              <a:rPr lang="en-GB" altLang="nl-BE" sz="2000" dirty="0"/>
-              <a:t> --&gt; </a:t>
-            </a:r>
-            <a:r>
-              <a:rPr lang="en-GB" altLang="nl-BE" sz="2000" dirty="0">
-                <a:solidFill>
-                  <a:srgbClr val="FF0000"/>
-                </a:solidFill>
-              </a:rPr>
-              <a:t>look at </a:t>
-            </a:r>
-            <a:r>
-              <a:rPr lang="en-GB" altLang="nl-BE" sz="2000" dirty="0" err="1" smtClean="0">
-                <a:solidFill>
-                  <a:srgbClr val="FF0000"/>
-                </a:solidFill>
-              </a:rPr>
-              <a:t>Buildings.Examples.Tutorial</a:t>
-            </a:r>
-            <a:endParaRPr lang="en-GB" altLang="nl-BE" sz="2000" dirty="0">
-              <a:solidFill>
-                <a:srgbClr val="FF0000"/>
-              </a:solidFill>
-            </a:endParaRPr>
-          </a:p>
-          <a:p>
-            <a:pPr>
-              <a:defRPr/>
-            </a:pPr>
-            <a:r>
-              <a:rPr lang="en-GB" altLang="nl-BE" sz="2000" dirty="0" smtClean="0">
-                <a:solidFill>
-                  <a:schemeClr val="accent1"/>
-                </a:solidFill>
-              </a:rPr>
-              <a:t>Annex 60:</a:t>
-            </a:r>
-            <a:r>
-              <a:rPr lang="en-GB" altLang="nl-BE" sz="2000" dirty="0">
-                <a:solidFill>
-                  <a:schemeClr val="accent1"/>
-                </a:solidFill>
-              </a:rPr>
-              <a:t> </a:t>
-            </a:r>
-            <a:r>
-              <a:rPr lang="en-GB" altLang="nl-BE" sz="2000" dirty="0" smtClean="0">
-                <a:solidFill>
-                  <a:srgbClr val="FF0000"/>
-                </a:solidFill>
-                <a:hlinkClick r:id="rId10"/>
-              </a:rPr>
-              <a:t>https</a:t>
-            </a:r>
-            <a:r>
-              <a:rPr lang="en-GB" altLang="nl-BE" sz="2000" dirty="0">
-                <a:solidFill>
-                  <a:srgbClr val="FF0000"/>
-                </a:solidFill>
-                <a:hlinkClick r:id="rId10"/>
-              </a:rPr>
-              <a:t>://github.com/iea-annex60/modelica-</a:t>
-            </a:r>
-            <a:r>
-              <a:rPr lang="en-GB" altLang="nl-BE" sz="2000" dirty="0" smtClean="0">
-                <a:solidFill>
-                  <a:srgbClr val="FF0000"/>
-                </a:solidFill>
-                <a:hlinkClick r:id="rId10"/>
-              </a:rPr>
-              <a:t>annex60</a:t>
-            </a:r>
-            <a:r>
-              <a:rPr lang="en-GB" altLang="nl-BE" sz="2000" dirty="0" smtClean="0">
-                <a:solidFill>
-                  <a:srgbClr val="FF0000"/>
-                </a:solidFill>
-              </a:rPr>
-              <a:t> </a:t>
-            </a:r>
-          </a:p>
-          <a:p>
-            <a:pPr marL="0" indent="0">
-              <a:buNone/>
-              <a:defRPr/>
-            </a:pPr>
-            <a:r>
-              <a:rPr lang="en-GB" altLang="nl-BE" sz="2000" b="1" dirty="0" err="1" smtClean="0"/>
-              <a:t>Dymola</a:t>
-            </a:r>
-            <a:r>
-              <a:rPr lang="en-GB" altLang="nl-BE" sz="2000" b="1" dirty="0" smtClean="0"/>
-              <a:t> </a:t>
-            </a:r>
-            <a:r>
-              <a:rPr lang="en-GB" altLang="nl-BE" sz="2000" b="1" dirty="0"/>
-              <a:t>user guide</a:t>
-            </a:r>
-          </a:p>
-          <a:p>
-            <a:pPr>
-              <a:defRPr/>
-            </a:pPr>
-            <a:r>
-              <a:rPr lang="en-GB" altLang="nl-BE" sz="2000" dirty="0"/>
-              <a:t>Volume 1 &amp; 2: </a:t>
-            </a:r>
-            <a:r>
-              <a:rPr lang="pt-BR" sz="2000" u="sng" dirty="0">
-                <a:solidFill>
-                  <a:schemeClr val="accent2"/>
-                </a:solidFill>
-              </a:rPr>
-              <a:t>C:\</a:t>
-            </a:r>
-            <a:r>
-              <a:rPr lang="pt-BR" sz="2000" u="sng" dirty="0" err="1">
-                <a:solidFill>
-                  <a:schemeClr val="accent2"/>
-                </a:solidFill>
-              </a:rPr>
-              <a:t>Program</a:t>
-            </a:r>
-            <a:r>
-              <a:rPr lang="pt-BR" sz="2000" u="sng" dirty="0">
-                <a:solidFill>
-                  <a:schemeClr val="accent2"/>
-                </a:solidFill>
-              </a:rPr>
-              <a:t> Files (x86)\</a:t>
-            </a:r>
-            <a:r>
-              <a:rPr lang="pt-BR" sz="2000" u="sng" dirty="0" err="1" smtClean="0">
-                <a:solidFill>
-                  <a:schemeClr val="accent2"/>
-                </a:solidFill>
-              </a:rPr>
-              <a:t>Dymola</a:t>
-            </a:r>
-            <a:r>
-              <a:rPr lang="pt-BR" sz="2000" u="sng" dirty="0" smtClean="0">
-                <a:solidFill>
-                  <a:schemeClr val="accent2"/>
-                </a:solidFill>
-              </a:rPr>
-              <a:t> 2017</a:t>
-            </a:r>
-            <a:r>
-              <a:rPr lang="pt-BR" sz="2000" u="sng" dirty="0">
-                <a:solidFill>
-                  <a:schemeClr val="accent2"/>
-                </a:solidFill>
-              </a:rPr>
-              <a:t>\</a:t>
-            </a:r>
-            <a:r>
-              <a:rPr lang="pt-BR" sz="2000" u="sng" dirty="0" err="1">
-                <a:solidFill>
-                  <a:schemeClr val="accent2"/>
-                </a:solidFill>
-              </a:rPr>
-              <a:t>Documentation</a:t>
-            </a:r>
-            <a:r>
-              <a:rPr lang="pt-BR" sz="2000" u="sng" dirty="0">
-                <a:solidFill>
-                  <a:schemeClr val="accent2"/>
-                </a:solidFill>
-              </a:rPr>
-              <a:t>\</a:t>
-            </a:r>
-            <a:r>
-              <a:rPr lang="pt-BR" sz="2000" u="sng" dirty="0" err="1">
-                <a:solidFill>
-                  <a:schemeClr val="accent2"/>
-                </a:solidFill>
-              </a:rPr>
-              <a:t>Dymola</a:t>
-            </a:r>
-            <a:r>
-              <a:rPr lang="pt-BR" sz="2000" u="sng" dirty="0">
-                <a:solidFill>
-                  <a:schemeClr val="accent2"/>
-                </a:solidFill>
-              </a:rPr>
-              <a:t> </a:t>
-            </a:r>
-            <a:r>
-              <a:rPr lang="pt-BR" sz="2000" u="sng" dirty="0" err="1">
-                <a:solidFill>
-                  <a:schemeClr val="accent2"/>
-                </a:solidFill>
-              </a:rPr>
-              <a:t>User</a:t>
-            </a:r>
-            <a:r>
-              <a:rPr lang="pt-BR" sz="2000" u="sng" dirty="0">
-                <a:solidFill>
-                  <a:schemeClr val="accent2"/>
-                </a:solidFill>
-              </a:rPr>
-              <a:t> Manual Volume </a:t>
-            </a:r>
-            <a:r>
-              <a:rPr lang="pt-BR" sz="2000" u="sng" dirty="0" smtClean="0">
-                <a:solidFill>
-                  <a:schemeClr val="accent2"/>
-                </a:solidFill>
-              </a:rPr>
-              <a:t>1</a:t>
-            </a:r>
-            <a:r>
-              <a:rPr lang="pt-BR" sz="2000" dirty="0" smtClean="0"/>
-              <a:t> </a:t>
-            </a:r>
-            <a:r>
-              <a:rPr lang="pt-BR" sz="2000" dirty="0" err="1"/>
-              <a:t>or</a:t>
-            </a:r>
-            <a:r>
-              <a:rPr lang="pt-BR" sz="2000" dirty="0"/>
-              <a:t> via </a:t>
-            </a:r>
-            <a:r>
-              <a:rPr lang="pt-BR" sz="2000" dirty="0" err="1"/>
-              <a:t>Dymola</a:t>
-            </a:r>
-            <a:r>
-              <a:rPr lang="pt-BR" sz="2000" dirty="0"/>
-              <a:t> &gt; help.</a:t>
-            </a:r>
-            <a:endParaRPr lang="en-GB" altLang="nl-BE" sz="2000" dirty="0"/>
-          </a:p>
-          <a:p>
-            <a:endParaRPr lang="en-GB" dirty="0"/>
+            <a:endParaRPr lang="en-US"/>
           </a:p>
         </p:txBody>
       </p:sp>
     </p:spTree>
     <p:extLst>
       <p:ext uri="{BB962C8B-B14F-4D97-AF65-F5344CB8AC3E}">
-        <p14:creationId xmlns:p14="http://schemas.microsoft.com/office/powerpoint/2010/main" val="2974380802"/>
+        <p14:creationId xmlns:p14="http://schemas.microsoft.com/office/powerpoint/2010/main" val="2938485761"/>
       </p:ext>
     </p:extLst>
   </p:cSld>
   <p:clrMapOvr>
     <a:masterClrMapping/>
   </p:clrMapOvr>
-  <p:timing>
-    <p:tnLst>
-      <p:par>
-        <p:cTn id="1" dur="indefinite" restart="never" nodeType="tmRoot"/>
-      </p:par>
-    </p:tnLst>
-  </p:timing>
 </p:sld>
 </file>
 
@@ -14546,7 +14100,7 @@
       </p:grpSpPr>
       <p:sp>
         <p:nvSpPr>
-          <p:cNvPr id="14338" name="Title 1"/>
+          <p:cNvPr id="2" name="Title 1"/>
           <p:cNvSpPr>
             <a:spLocks noGrp="1"/>
           </p:cNvSpPr>
@@ -14560,15 +14114,16 @@
           <a:lstStyle/>
           <a:p>
             <a:r>
-              <a:rPr lang="en-GB" altLang="nl-BE" smtClean="0"/>
-              <a:t>Fora</a:t>
-            </a:r>
-          </a:p>
-        </p:txBody>
-      </p:sp>
-      <p:sp>
-        <p:nvSpPr>
-          <p:cNvPr id="14339" name="Content Placeholder 2"/>
+              <a:rPr lang="nl-NL" dirty="0" err="1" smtClean="0"/>
+              <a:t>Inheritance</a:t>
+            </a:r>
+            <a:endParaRPr lang="nl-BE" dirty="0"/>
+          </a:p>
+        </p:txBody>
+      </p:sp>
+      <p:sp>
+        <p:nvSpPr>
+          <p:cNvPr id="3" name="Content Placeholder 2"/>
           <p:cNvSpPr>
             <a:spLocks noGrp="1"/>
           </p:cNvSpPr>
@@ -14582,68 +14137,134 @@
           <a:lstStyle/>
           <a:p>
             <a:r>
-              <a:rPr lang="en-GB" altLang="nl-BE" smtClean="0">
-                <a:hlinkClick r:id="rId2"/>
-              </a:rPr>
-              <a:t>http://www.openmodelica.org/index.php/forum</a:t>
-            </a:r>
-            <a:endParaRPr lang="en-GB" altLang="nl-BE" smtClean="0"/>
-          </a:p>
-          <a:p>
-            <a:r>
-              <a:rPr lang="en-GB" altLang="nl-BE" smtClean="0">
-                <a:hlinkClick r:id="rId3"/>
-              </a:rPr>
-              <a:t>http://www.jmodelica.org/forum</a:t>
-            </a:r>
-            <a:endParaRPr lang="en-GB" altLang="nl-BE" smtClean="0"/>
-          </a:p>
-          <a:p>
-            <a:r>
-              <a:rPr lang="en-GB" altLang="nl-BE" smtClean="0"/>
-              <a:t>www.stackoverflow.com (tag Modelica)</a:t>
-            </a:r>
-          </a:p>
-          <a:p>
-            <a:pPr>
-              <a:buFontTx/>
-              <a:buNone/>
-            </a:pPr>
-            <a:r>
-              <a:rPr lang="en-GB" altLang="nl-BE" smtClean="0"/>
-              <a:t>And last but not least: </a:t>
-            </a:r>
-            <a:r>
-              <a:rPr lang="en-GB" altLang="nl-BE" b="1" smtClean="0">
-                <a:solidFill>
-                  <a:srgbClr val="FF0000"/>
-                </a:solidFill>
-                <a:hlinkClick r:id="rId4"/>
-              </a:rPr>
-              <a:t>https://groups.google.com/d/forum/modelicans</a:t>
-            </a:r>
-            <a:endParaRPr lang="en-GB" altLang="nl-BE" b="1" smtClean="0">
-              <a:solidFill>
-                <a:srgbClr val="FF0000"/>
-              </a:solidFill>
+              <a:rPr lang="nl-NL" dirty="0" smtClean="0"/>
+              <a:t>Model </a:t>
+            </a:r>
+            <a:r>
+              <a:rPr lang="nl-NL" i="1" dirty="0" err="1" smtClean="0"/>
+              <a:t>inherits</a:t>
+            </a:r>
+            <a:r>
+              <a:rPr lang="nl-NL" i="1" dirty="0" smtClean="0"/>
+              <a:t> </a:t>
+            </a:r>
+            <a:r>
+              <a:rPr lang="nl-NL" dirty="0" err="1" smtClean="0"/>
+              <a:t>from</a:t>
+            </a:r>
+            <a:r>
+              <a:rPr lang="nl-NL" dirty="0" smtClean="0"/>
+              <a:t> </a:t>
+            </a:r>
+            <a:r>
+              <a:rPr lang="nl-NL" dirty="0" err="1" smtClean="0"/>
+              <a:t>other</a:t>
+            </a:r>
+            <a:r>
+              <a:rPr lang="nl-NL" dirty="0" smtClean="0"/>
+              <a:t> model</a:t>
+            </a:r>
+          </a:p>
+          <a:p>
+            <a:pPr lvl="1"/>
+            <a:r>
+              <a:rPr lang="nl-NL" i="1" dirty="0" smtClean="0"/>
+              <a:t>Variables, parameters, </a:t>
+            </a:r>
+            <a:r>
+              <a:rPr lang="nl-NL" i="1" dirty="0" err="1" smtClean="0"/>
+              <a:t>equations</a:t>
+            </a:r>
+            <a:endParaRPr lang="nl-NL" i="1" dirty="0" smtClean="0"/>
+          </a:p>
+          <a:p>
+            <a:r>
+              <a:rPr lang="nl-NL" dirty="0" err="1" smtClean="0">
+                <a:latin typeface="Monaco" panose="020B0509030404040204" pitchFamily="49" charset="0"/>
+              </a:rPr>
+              <a:t>partial</a:t>
+            </a:r>
+            <a:r>
+              <a:rPr lang="nl-NL" dirty="0" smtClean="0">
+                <a:latin typeface="Monaco" panose="020B0509030404040204" pitchFamily="49" charset="0"/>
+              </a:rPr>
+              <a:t> model</a:t>
+            </a:r>
+          </a:p>
+          <a:p>
+            <a:r>
+              <a:rPr lang="nl-NL" dirty="0" smtClean="0">
+                <a:latin typeface="+mj-lt"/>
+              </a:rPr>
+              <a:t>Code </a:t>
+            </a:r>
+            <a:r>
+              <a:rPr lang="nl-NL" dirty="0" err="1" smtClean="0">
+                <a:latin typeface="+mj-lt"/>
+              </a:rPr>
+              <a:t>can</a:t>
+            </a:r>
+            <a:r>
+              <a:rPr lang="nl-NL" dirty="0" smtClean="0">
+                <a:latin typeface="+mj-lt"/>
+              </a:rPr>
+              <a:t> </a:t>
+            </a:r>
+            <a:r>
+              <a:rPr lang="nl-NL" dirty="0" err="1" smtClean="0">
+                <a:latin typeface="+mj-lt"/>
+              </a:rPr>
+              <a:t>be</a:t>
+            </a:r>
+            <a:r>
+              <a:rPr lang="nl-NL" dirty="0" smtClean="0">
+                <a:latin typeface="+mj-lt"/>
+              </a:rPr>
+              <a:t> </a:t>
+            </a:r>
+            <a:r>
+              <a:rPr lang="nl-NL" dirty="0" err="1" smtClean="0">
+                <a:latin typeface="+mj-lt"/>
+              </a:rPr>
+              <a:t>managed</a:t>
+            </a:r>
+            <a:r>
+              <a:rPr lang="nl-NL" dirty="0" smtClean="0">
+                <a:latin typeface="+mj-lt"/>
+              </a:rPr>
+              <a:t> more </a:t>
+            </a:r>
+            <a:r>
+              <a:rPr lang="nl-NL" dirty="0" err="1" smtClean="0">
+                <a:latin typeface="+mj-lt"/>
+              </a:rPr>
+              <a:t>easily</a:t>
+            </a:r>
+            <a:endParaRPr lang="nl-NL" dirty="0" smtClean="0">
+              <a:latin typeface="+mj-lt"/>
             </a:endParaRPr>
           </a:p>
           <a:p>
-            <a:pPr>
-              <a:buFontTx/>
-              <a:buNone/>
-            </a:pPr>
-            <a:endParaRPr lang="en-GB" altLang="nl-BE" smtClean="0"/>
-          </a:p>
-          <a:p>
-            <a:endParaRPr lang="en-GB" altLang="nl-BE" smtClean="0"/>
+            <a:r>
+              <a:rPr lang="nl-NL" dirty="0" err="1" smtClean="0">
+                <a:latin typeface="+mj-lt"/>
+              </a:rPr>
+              <a:t>Example</a:t>
+            </a:r>
+            <a:endParaRPr lang="nl-NL" dirty="0" smtClean="0">
+              <a:latin typeface="+mj-lt"/>
+            </a:endParaRPr>
+          </a:p>
+          <a:p>
+            <a:pPr lvl="1"/>
+            <a:endParaRPr lang="nl-BE" dirty="0"/>
           </a:p>
         </p:txBody>
       </p:sp>
     </p:spTree>
     <p:extLst>
       <p:ext uri="{BB962C8B-B14F-4D97-AF65-F5344CB8AC3E}">
-        <p14:creationId xmlns:p14="http://schemas.microsoft.com/office/powerpoint/2010/main" val="1252393520"/>
+        <p14:creationId xmlns:p14="http://schemas.microsoft.com/office/powerpoint/2010/main" val="1964542570"/>
       </p:ext>
     </p:extLst>
   </p:cSld>
@@ -14679,7 +14300,7 @@
       </p:grpSpPr>
       <p:sp>
         <p:nvSpPr>
-          <p:cNvPr id="15362" name="Title 1"/>
+          <p:cNvPr id="2" name="Title 1"/>
           <p:cNvSpPr>
             <a:spLocks noGrp="1"/>
           </p:cNvSpPr>
@@ -14693,13 +14314,10 @@
           <a:lstStyle/>
           <a:p>
             <a:r>
-              <a:rPr lang="en-GB" altLang="nl-BE" smtClean="0">
-                <a:latin typeface="Arial" charset="0"/>
-                <a:cs typeface="Arial" charset="0"/>
-              </a:rPr>
-              <a:t>Use of Dymola with KULeuven license</a:t>
-            </a:r>
-            <a:endParaRPr lang="nl-BE" altLang="nl-BE" smtClean="0"/>
+              <a:rPr lang="en-GB" dirty="0" smtClean="0"/>
+              <a:t>Interface with other programs</a:t>
+            </a:r>
+            <a:endParaRPr lang="en-GB" dirty="0"/>
           </a:p>
         </p:txBody>
       </p:sp>
@@ -14718,148 +14336,127 @@
           <a:bodyPr/>
           <a:lstStyle/>
           <a:p>
-            <a:pPr marL="0" indent="0">
-              <a:buFontTx/>
-              <a:buNone/>
-              <a:defRPr/>
-            </a:pPr>
-            <a:r>
-              <a:rPr lang="nl-BE" dirty="0" smtClean="0"/>
-              <a:t>Access to a floating licence (on the building physics server).</a:t>
-            </a:r>
-          </a:p>
-          <a:p>
-            <a:pPr>
-              <a:defRPr/>
-            </a:pPr>
-            <a:r>
-              <a:rPr lang="nl-BE" dirty="0" smtClean="0"/>
-              <a:t>Connected physically</a:t>
-            </a:r>
-            <a:r>
-              <a:rPr lang="nl-BE" dirty="0"/>
-              <a:t> (cable)</a:t>
-            </a:r>
-            <a:r>
-              <a:rPr lang="nl-BE" dirty="0" smtClean="0"/>
-              <a:t> to the building physics or  mech network</a:t>
-            </a:r>
-          </a:p>
-          <a:p>
-            <a:pPr>
-              <a:defRPr/>
-            </a:pPr>
-            <a:r>
-              <a:rPr lang="nl-BE" dirty="0" smtClean="0"/>
-              <a:t>Open Dymola and go to help&gt;licence..</a:t>
-            </a:r>
-          </a:p>
-          <a:p>
-            <a:pPr>
-              <a:defRPr/>
-            </a:pPr>
-            <a:r>
-              <a:rPr lang="nl-NL" b="1" dirty="0" smtClean="0"/>
-              <a:t>Enter 10.112.72.4</a:t>
-            </a:r>
-            <a:r>
-              <a:rPr lang="nl-NL" dirty="0" smtClean="0"/>
+            <a:r>
+              <a:rPr lang="en-GB" dirty="0" smtClean="0"/>
+              <a:t>Scripting</a:t>
+            </a:r>
+          </a:p>
+          <a:p>
+            <a:pPr lvl="1"/>
+            <a:r>
+              <a:rPr lang="en-GB" dirty="0" smtClean="0"/>
+              <a:t>Parameter variation</a:t>
+            </a:r>
+          </a:p>
+          <a:p>
+            <a:pPr lvl="1"/>
+            <a:r>
+              <a:rPr lang="en-GB" dirty="0" smtClean="0"/>
+              <a:t>Parallel simulations</a:t>
+            </a:r>
+          </a:p>
+          <a:p>
+            <a:pPr lvl="1"/>
+            <a:r>
+              <a:rPr lang="en-GB" dirty="0" smtClean="0"/>
+              <a:t>Optimal control</a:t>
+            </a:r>
+          </a:p>
+          <a:p>
+            <a:r>
+              <a:rPr lang="en-GB" dirty="0" smtClean="0"/>
+              <a:t>Python </a:t>
+            </a:r>
+            <a:r>
+              <a:rPr lang="en-GB" dirty="0" smtClean="0"/>
+              <a:t>scripts</a:t>
+            </a:r>
+            <a:endParaRPr lang="en-GB" i="1" dirty="0" smtClean="0"/>
+          </a:p>
+          <a:p>
+            <a:pPr lvl="1"/>
+            <a:r>
+              <a:rPr lang="en-GB" dirty="0" smtClean="0"/>
+              <a:t>Nice for </a:t>
+            </a:r>
+            <a:r>
+              <a:rPr lang="en-GB" dirty="0" smtClean="0"/>
+              <a:t>plotting</a:t>
+            </a:r>
+          </a:p>
+          <a:p>
+            <a:pPr lvl="1"/>
+            <a:r>
+              <a:rPr lang="en-GB" dirty="0" err="1" smtClean="0"/>
+              <a:t>BuildingsPy</a:t>
+            </a:r>
+            <a:r>
+              <a:rPr lang="en-GB" dirty="0" smtClean="0"/>
               <a:t> </a:t>
             </a:r>
-            <a:br>
-              <a:rPr lang="nl-NL" dirty="0" smtClean="0"/>
-            </a:br>
-            <a:r>
-              <a:rPr lang="nl-NL" dirty="0" smtClean="0"/>
-              <a:t>and follow instructions</a:t>
-            </a:r>
-          </a:p>
-          <a:p>
-            <a:pPr>
-              <a:defRPr/>
-            </a:pPr>
-            <a:endParaRPr lang="nl-NL" dirty="0"/>
-          </a:p>
-          <a:p>
-            <a:pPr>
-              <a:defRPr/>
-            </a:pPr>
-            <a:r>
-              <a:rPr lang="nl-NL" dirty="0" smtClean="0"/>
-              <a:t>More information on </a:t>
-            </a:r>
-            <a:r>
-              <a:rPr lang="nl-NL" dirty="0" smtClean="0">
+            <a:r>
+              <a:rPr lang="en-GB" sz="1800" dirty="0" smtClean="0"/>
+              <a:t>(</a:t>
+            </a:r>
+            <a:r>
+              <a:rPr lang="en-GB" sz="1800" dirty="0" smtClean="0">
                 <a:hlinkClick r:id="rId2"/>
               </a:rPr>
-              <a:t>Modelicans</a:t>
-            </a:r>
-            <a:r>
-              <a:rPr lang="nl-NL" dirty="0" smtClean="0"/>
-              <a:t> (google groups)</a:t>
-            </a:r>
-            <a:endParaRPr lang="nl-BE" dirty="0"/>
-          </a:p>
-        </p:txBody>
-      </p:sp>
-      <p:pic>
-        <p:nvPicPr>
-          <p:cNvPr id="15364" name="Picture 4"/>
-          <p:cNvPicPr>
-            <a:picLocks noChangeAspect="1" noChangeArrowheads="1"/>
-          </p:cNvPicPr>
-          <p:nvPr/>
-        </p:nvPicPr>
-        <p:blipFill>
-          <a:blip r:embed="rId3">
-            <a:extLst>
-              <a:ext uri="{28A0092B-C50C-407E-A947-70E740481C1C}">
-                <a14:useLocalDpi xmlns:a14="http://schemas.microsoft.com/office/drawing/2010/main" val="0"/>
-              </a:ext>
-            </a:extLst>
-          </a:blip>
-          <a:srcRect/>
-          <a:stretch>
-            <a:fillRect/>
-          </a:stretch>
-        </p:blipFill>
-        <p:spPr bwMode="auto">
-          <a:xfrm>
-            <a:off x="4431928" y="5466184"/>
-            <a:ext cx="3590925" cy="1581150"/>
-          </a:xfrm>
-          <a:prstGeom prst="rect">
-            <a:avLst/>
-          </a:prstGeom>
-          <a:noFill/>
-          <a:ln>
-            <a:noFill/>
-          </a:ln>
-          <a:extLst>
-            <a:ext uri="{909E8E84-426E-40DD-AFC4-6F175D3DCCD1}">
-              <a14:hiddenFill xmlns:a14="http://schemas.microsoft.com/office/drawing/2010/main">
-                <a:solidFill>
-                  <a:schemeClr val="accent1"/>
-                </a:solidFill>
-              </a14:hiddenFill>
-            </a:ext>
-            <a:ext uri="{91240B29-F687-4F45-9708-019B960494DF}">
-              <a14:hiddenLine xmlns:a14="http://schemas.microsoft.com/office/drawing/2010/main" w="9525">
-                <a:solidFill>
-                  <a:schemeClr val="tx1"/>
-                </a:solidFill>
-                <a:miter lim="800000"/>
-                <a:headEnd/>
-                <a:tailEnd/>
-              </a14:hiddenLine>
-            </a:ext>
-          </a:extLst>
-        </p:spPr>
-      </p:pic>
+              <a:t>http</a:t>
+            </a:r>
+            <a:r>
+              <a:rPr lang="en-GB" sz="1800" dirty="0">
+                <a:hlinkClick r:id="rId2"/>
+              </a:rPr>
+              <a:t>://simulationresearch.lbl.gov/modelica/buildingspy</a:t>
+            </a:r>
+            <a:r>
+              <a:rPr lang="en-GB" sz="1800" dirty="0" smtClean="0">
+                <a:hlinkClick r:id="rId2"/>
+              </a:rPr>
+              <a:t>/</a:t>
+            </a:r>
+            <a:r>
+              <a:rPr lang="en-GB" sz="1800" dirty="0" smtClean="0"/>
+              <a:t>)</a:t>
+            </a:r>
+            <a:r>
+              <a:rPr lang="en-GB" dirty="0" smtClean="0"/>
+              <a:t> </a:t>
+            </a:r>
+          </a:p>
+          <a:p>
+            <a:pPr lvl="1"/>
+            <a:r>
+              <a:rPr lang="en-GB" dirty="0" smtClean="0"/>
+              <a:t>Built-in interface</a:t>
+            </a:r>
+            <a:endParaRPr lang="en-GB" dirty="0" smtClean="0"/>
+          </a:p>
+          <a:p>
+            <a:r>
+              <a:rPr lang="en-GB" dirty="0" smtClean="0"/>
+              <a:t>MATLAB</a:t>
+            </a:r>
+          </a:p>
+          <a:p>
+            <a:pPr lvl="1"/>
+            <a:r>
+              <a:rPr lang="en-GB" dirty="0" smtClean="0"/>
+              <a:t>Built-in with </a:t>
+            </a:r>
+            <a:r>
+              <a:rPr lang="en-GB" dirty="0" err="1" smtClean="0"/>
+              <a:t>Dymola</a:t>
+            </a:r>
+            <a:endParaRPr lang="en-GB" dirty="0"/>
+          </a:p>
+        </p:txBody>
+      </p:sp>
     </p:spTree>
     <p:extLst>
       <p:ext uri="{BB962C8B-B14F-4D97-AF65-F5344CB8AC3E}">
-        <p14:creationId xmlns:p14="http://schemas.microsoft.com/office/powerpoint/2010/main" val="3727398000"/>
+        <p14:creationId xmlns:p14="http://schemas.microsoft.com/office/powerpoint/2010/main" val="4225182537"/>
       </p:ext>
     </p:extLst>
   </p:cSld>
@@ -14895,7 +14492,7 @@
       </p:grpSpPr>
       <p:sp>
         <p:nvSpPr>
-          <p:cNvPr id="2" name="Title 1"/>
+          <p:cNvPr id="13314" name="Title 1"/>
           <p:cNvSpPr>
             <a:spLocks noGrp="1"/>
           </p:cNvSpPr>
@@ -14909,16 +14506,545 @@
           <a:lstStyle/>
           <a:p>
             <a:r>
-              <a:rPr lang="en-GB" dirty="0" smtClean="0"/>
-              <a:t>Break</a:t>
-            </a:r>
+              <a:rPr lang="en-GB" altLang="nl-BE" smtClean="0"/>
+              <a:t>Websites</a:t>
+            </a:r>
+          </a:p>
+        </p:txBody>
+      </p:sp>
+      <p:sp>
+        <p:nvSpPr>
+          <p:cNvPr id="36867" name="Content Placeholder 2"/>
+          <p:cNvSpPr>
+            <a:spLocks noGrp="1"/>
+          </p:cNvSpPr>
+          <p:nvPr>
+            <p:ph sz="half" idx="1"/>
+          </p:nvPr>
+        </p:nvSpPr>
+        <p:spPr/>
+        <p:txBody>
+          <a:bodyPr/>
+          <a:lstStyle/>
+          <a:p>
+            <a:pPr marL="0" indent="0">
+              <a:buFontTx/>
+              <a:buNone/>
+              <a:defRPr/>
+            </a:pPr>
+            <a:r>
+              <a:rPr lang="en-GB" altLang="nl-BE" sz="2000" b="1" dirty="0" smtClean="0"/>
+              <a:t>General</a:t>
+            </a:r>
+          </a:p>
+          <a:p>
+            <a:pPr>
+              <a:defRPr/>
+            </a:pPr>
+            <a:r>
+              <a:rPr lang="en-GB" altLang="nl-BE" sz="2000" dirty="0"/>
+              <a:t>www.modelica.org</a:t>
+            </a:r>
+          </a:p>
+          <a:p>
+            <a:pPr>
+              <a:defRPr/>
+            </a:pPr>
+            <a:r>
+              <a:rPr lang="en-GB" altLang="nl-BE" sz="2000" dirty="0" smtClean="0">
+                <a:hlinkClick r:id="rId2"/>
+              </a:rPr>
+              <a:t>www.openmodelica.org</a:t>
+            </a:r>
+            <a:endParaRPr lang="en-GB" altLang="nl-BE" sz="2000" dirty="0" smtClean="0"/>
+          </a:p>
+          <a:p>
+            <a:pPr>
+              <a:defRPr/>
+            </a:pPr>
+            <a:r>
+              <a:rPr lang="en-GB" altLang="nl-BE" sz="2000" dirty="0" smtClean="0">
+                <a:hlinkClick r:id="rId3"/>
+              </a:rPr>
+              <a:t>www.jmodelica.org</a:t>
+            </a:r>
+            <a:endParaRPr lang="en-GB" altLang="nl-BE" sz="2000" dirty="0" smtClean="0"/>
+          </a:p>
+          <a:p>
+            <a:pPr>
+              <a:defRPr/>
+            </a:pPr>
+            <a:r>
+              <a:rPr lang="en-GB" altLang="nl-BE" sz="2000" dirty="0" smtClean="0">
+                <a:hlinkClick r:id="rId4"/>
+              </a:rPr>
+              <a:t>http://www.claytex.com/tech-blog/</a:t>
+            </a:r>
+            <a:endParaRPr lang="en-GB" altLang="nl-BE" sz="2000" dirty="0" smtClean="0"/>
+          </a:p>
+          <a:p>
+            <a:pPr marL="0" indent="0">
+              <a:buFontTx/>
+              <a:buNone/>
+              <a:defRPr/>
+            </a:pPr>
+            <a:r>
+              <a:rPr lang="en-GB" altLang="nl-BE" sz="2000" b="1" dirty="0" err="1" smtClean="0"/>
+              <a:t>Modelica</a:t>
+            </a:r>
+            <a:r>
+              <a:rPr lang="en-GB" altLang="nl-BE" sz="2000" b="1" dirty="0" smtClean="0"/>
+              <a:t> language</a:t>
+            </a:r>
+          </a:p>
+          <a:p>
+            <a:pPr>
+              <a:defRPr/>
+            </a:pPr>
+            <a:r>
+              <a:rPr lang="en-GB" altLang="nl-BE" sz="2000" dirty="0" smtClean="0">
+                <a:hlinkClick r:id="rId5"/>
+              </a:rPr>
+              <a:t>http://modref.xogeny.com/</a:t>
+            </a:r>
+            <a:r>
+              <a:rPr lang="en-GB" altLang="nl-BE" sz="2000" dirty="0" smtClean="0"/>
+              <a:t> </a:t>
+            </a:r>
+            <a:r>
+              <a:rPr lang="en-GB" altLang="nl-BE" sz="2000" dirty="0" smtClean="0">
+                <a:solidFill>
+                  <a:srgbClr val="FF0000"/>
+                </a:solidFill>
+              </a:rPr>
+              <a:t>!!!</a:t>
+            </a:r>
+          </a:p>
+          <a:p>
+            <a:pPr>
+              <a:defRPr/>
+            </a:pPr>
+            <a:r>
+              <a:rPr lang="en-GB" altLang="nl-BE" sz="2000" dirty="0">
+                <a:hlinkClick r:id="rId6"/>
+              </a:rPr>
+              <a:t>http://book.xogeny.com</a:t>
+            </a:r>
+            <a:r>
+              <a:rPr lang="en-GB" altLang="nl-BE" sz="2000" dirty="0" smtClean="0">
+                <a:hlinkClick r:id="rId6"/>
+              </a:rPr>
+              <a:t>/</a:t>
+            </a:r>
+            <a:r>
+              <a:rPr lang="en-GB" altLang="nl-BE" sz="2000" dirty="0" smtClean="0"/>
+              <a:t> </a:t>
+            </a:r>
+            <a:r>
+              <a:rPr lang="en-GB" altLang="nl-BE" sz="2000" dirty="0" smtClean="0">
+                <a:solidFill>
+                  <a:srgbClr val="FF0000"/>
+                </a:solidFill>
+              </a:rPr>
+              <a:t>!!!</a:t>
+            </a:r>
+            <a:endParaRPr lang="en-GB" altLang="nl-BE" sz="2000" dirty="0" smtClean="0"/>
+          </a:p>
+          <a:p>
+            <a:pPr marL="0" indent="0">
+              <a:buFontTx/>
+              <a:buNone/>
+              <a:defRPr/>
+            </a:pPr>
+            <a:r>
+              <a:rPr lang="en-GB" altLang="nl-BE" sz="2000" b="1" dirty="0" smtClean="0"/>
+              <a:t>KUL </a:t>
+            </a:r>
+            <a:r>
+              <a:rPr lang="en-GB" altLang="nl-BE" sz="2000" b="1" dirty="0" err="1" smtClean="0"/>
+              <a:t>modeling</a:t>
+            </a:r>
+            <a:r>
+              <a:rPr lang="en-GB" altLang="nl-BE" sz="2000" b="1" dirty="0" smtClean="0"/>
+              <a:t> conventions</a:t>
+            </a:r>
+          </a:p>
+          <a:p>
+            <a:pPr>
+              <a:defRPr/>
+            </a:pPr>
+            <a:r>
+              <a:rPr lang="en-GB" altLang="nl-BE" sz="2000" dirty="0" smtClean="0">
+                <a:hlinkClick r:id="rId7"/>
+              </a:rPr>
+              <a:t>https://docs.google.com/document/d/1MaNKTdLz-YPpEEH3Eg12ECzG0ErK-rIK9IHd6gsBp7Q/edit?usp=sharing</a:t>
+            </a:r>
+            <a:endParaRPr lang="en-GB" altLang="nl-BE" sz="2000" dirty="0" smtClean="0"/>
+          </a:p>
+          <a:p>
+            <a:pPr>
+              <a:defRPr/>
+            </a:pPr>
+            <a:endParaRPr lang="en-GB" altLang="nl-BE" sz="2400" dirty="0" smtClean="0"/>
+          </a:p>
+          <a:p>
+            <a:pPr>
+              <a:defRPr/>
+            </a:pPr>
+            <a:endParaRPr lang="en-GB" altLang="nl-BE" sz="2400" dirty="0" smtClean="0"/>
+          </a:p>
+        </p:txBody>
+      </p:sp>
+      <p:sp>
+        <p:nvSpPr>
+          <p:cNvPr id="2" name="Content Placeholder 1"/>
+          <p:cNvSpPr>
+            <a:spLocks noGrp="1"/>
+          </p:cNvSpPr>
+          <p:nvPr>
+            <p:ph sz="half" idx="2"/>
+          </p:nvPr>
+        </p:nvSpPr>
+        <p:spPr/>
+        <p:txBody>
+          <a:bodyPr>
+            <a:normAutofit/>
+          </a:bodyPr>
+          <a:lstStyle/>
+          <a:p>
+            <a:pPr marL="0" indent="0">
+              <a:buFontTx/>
+              <a:buNone/>
+              <a:defRPr/>
+            </a:pPr>
+            <a:r>
+              <a:rPr lang="en-GB" altLang="nl-BE" sz="2000" b="1" dirty="0"/>
+              <a:t>Libraries:</a:t>
+            </a:r>
+          </a:p>
+          <a:p>
+            <a:pPr>
+              <a:defRPr/>
+            </a:pPr>
+            <a:r>
+              <a:rPr lang="en-GB" altLang="nl-BE" sz="2000" dirty="0">
+                <a:hlinkClick r:id="rId8"/>
+              </a:rPr>
+              <a:t>https://github.com/open-ideas</a:t>
+            </a:r>
+            <a:r>
+              <a:rPr lang="en-GB" altLang="nl-BE" sz="2000" dirty="0"/>
+              <a:t> --&gt; IDEAS + Crash Course</a:t>
+            </a:r>
+          </a:p>
+          <a:p>
+            <a:pPr>
+              <a:defRPr/>
+            </a:pPr>
+            <a:r>
+              <a:rPr lang="en-GB" altLang="nl-BE" sz="2000" dirty="0">
+                <a:hlinkClick r:id="rId9"/>
+              </a:rPr>
+              <a:t>https://simulationresearch.lbl.gov/modelica</a:t>
+            </a:r>
+            <a:r>
+              <a:rPr lang="en-GB" altLang="nl-BE" sz="2000" dirty="0"/>
+              <a:t> --&gt; </a:t>
+            </a:r>
+            <a:r>
+              <a:rPr lang="en-GB" altLang="nl-BE" sz="2000" dirty="0">
+                <a:solidFill>
+                  <a:srgbClr val="FF0000"/>
+                </a:solidFill>
+              </a:rPr>
+              <a:t>look at </a:t>
+            </a:r>
+            <a:r>
+              <a:rPr lang="en-GB" altLang="nl-BE" sz="2000" dirty="0" err="1" smtClean="0">
+                <a:solidFill>
+                  <a:srgbClr val="FF0000"/>
+                </a:solidFill>
+              </a:rPr>
+              <a:t>Buildings.Examples.Tutorial</a:t>
+            </a:r>
+            <a:endParaRPr lang="en-GB" altLang="nl-BE" sz="2000" dirty="0">
+              <a:solidFill>
+                <a:srgbClr val="FF0000"/>
+              </a:solidFill>
+            </a:endParaRPr>
+          </a:p>
+          <a:p>
+            <a:pPr>
+              <a:defRPr/>
+            </a:pPr>
+            <a:r>
+              <a:rPr lang="en-GB" altLang="nl-BE" sz="2000" dirty="0" smtClean="0">
+                <a:solidFill>
+                  <a:schemeClr val="accent1"/>
+                </a:solidFill>
+              </a:rPr>
+              <a:t>IBPSA Project 1: </a:t>
+            </a:r>
+            <a:r>
+              <a:rPr lang="en-GB" altLang="nl-BE" sz="2000" dirty="0" smtClean="0">
+                <a:solidFill>
+                  <a:srgbClr val="FF0000"/>
+                </a:solidFill>
+                <a:hlinkClick r:id="rId10"/>
+              </a:rPr>
+              <a:t>https</a:t>
+            </a:r>
+            <a:r>
+              <a:rPr lang="en-GB" altLang="nl-BE" sz="2000" dirty="0">
+                <a:solidFill>
+                  <a:srgbClr val="FF0000"/>
+                </a:solidFill>
+                <a:hlinkClick r:id="rId10"/>
+              </a:rPr>
+              <a:t>://</a:t>
+            </a:r>
+            <a:r>
+              <a:rPr lang="en-GB" altLang="nl-BE" sz="2000" dirty="0" smtClean="0">
+                <a:solidFill>
+                  <a:srgbClr val="FF0000"/>
+                </a:solidFill>
+                <a:hlinkClick r:id="rId10"/>
+              </a:rPr>
+              <a:t>github.com/ibpsa/modelica-ibpsa</a:t>
+            </a:r>
+            <a:r>
+              <a:rPr lang="en-GB" altLang="nl-BE" sz="2000" dirty="0" smtClean="0">
+                <a:solidFill>
+                  <a:srgbClr val="FF0000"/>
+                </a:solidFill>
+              </a:rPr>
+              <a:t> </a:t>
+            </a:r>
+            <a:endParaRPr lang="en-GB" altLang="nl-BE" sz="2000" dirty="0" smtClean="0">
+              <a:solidFill>
+                <a:srgbClr val="FF0000"/>
+              </a:solidFill>
+            </a:endParaRPr>
+          </a:p>
+          <a:p>
+            <a:pPr marL="0" indent="0">
+              <a:buNone/>
+              <a:defRPr/>
+            </a:pPr>
+            <a:r>
+              <a:rPr lang="en-GB" altLang="nl-BE" sz="2000" b="1" dirty="0" err="1" smtClean="0"/>
+              <a:t>Dymola</a:t>
+            </a:r>
+            <a:r>
+              <a:rPr lang="en-GB" altLang="nl-BE" sz="2000" b="1" dirty="0" smtClean="0"/>
+              <a:t> </a:t>
+            </a:r>
+            <a:r>
+              <a:rPr lang="en-GB" altLang="nl-BE" sz="2000" b="1" dirty="0"/>
+              <a:t>user guide</a:t>
+            </a:r>
+          </a:p>
+          <a:p>
+            <a:pPr>
+              <a:defRPr/>
+            </a:pPr>
+            <a:r>
+              <a:rPr lang="en-GB" altLang="nl-BE" sz="2000" dirty="0"/>
+              <a:t>Volume 1 &amp; 2: </a:t>
+            </a:r>
+            <a:r>
+              <a:rPr lang="pt-BR" sz="2000" u="sng" dirty="0">
+                <a:solidFill>
+                  <a:schemeClr val="accent2"/>
+                </a:solidFill>
+              </a:rPr>
+              <a:t>C:\</a:t>
+            </a:r>
+            <a:r>
+              <a:rPr lang="pt-BR" sz="2000" u="sng" dirty="0" err="1">
+                <a:solidFill>
+                  <a:schemeClr val="accent2"/>
+                </a:solidFill>
+              </a:rPr>
+              <a:t>Program</a:t>
+            </a:r>
+            <a:r>
+              <a:rPr lang="pt-BR" sz="2000" u="sng" dirty="0">
+                <a:solidFill>
+                  <a:schemeClr val="accent2"/>
+                </a:solidFill>
+              </a:rPr>
+              <a:t> Files (x86)\</a:t>
+            </a:r>
+            <a:r>
+              <a:rPr lang="pt-BR" sz="2000" u="sng" dirty="0" err="1" smtClean="0">
+                <a:solidFill>
+                  <a:schemeClr val="accent2"/>
+                </a:solidFill>
+              </a:rPr>
+              <a:t>Dymola</a:t>
+            </a:r>
+            <a:r>
+              <a:rPr lang="pt-BR" sz="2000" u="sng" dirty="0" smtClean="0">
+                <a:solidFill>
+                  <a:schemeClr val="accent2"/>
+                </a:solidFill>
+              </a:rPr>
+              <a:t> 2017</a:t>
+            </a:r>
+            <a:r>
+              <a:rPr lang="pt-BR" sz="2000" u="sng" dirty="0">
+                <a:solidFill>
+                  <a:schemeClr val="accent2"/>
+                </a:solidFill>
+              </a:rPr>
+              <a:t>\</a:t>
+            </a:r>
+            <a:r>
+              <a:rPr lang="pt-BR" sz="2000" u="sng" dirty="0" err="1">
+                <a:solidFill>
+                  <a:schemeClr val="accent2"/>
+                </a:solidFill>
+              </a:rPr>
+              <a:t>Documentation</a:t>
+            </a:r>
+            <a:r>
+              <a:rPr lang="pt-BR" sz="2000" u="sng" dirty="0">
+                <a:solidFill>
+                  <a:schemeClr val="accent2"/>
+                </a:solidFill>
+              </a:rPr>
+              <a:t>\</a:t>
+            </a:r>
+            <a:r>
+              <a:rPr lang="pt-BR" sz="2000" u="sng" dirty="0" err="1">
+                <a:solidFill>
+                  <a:schemeClr val="accent2"/>
+                </a:solidFill>
+              </a:rPr>
+              <a:t>Dymola</a:t>
+            </a:r>
+            <a:r>
+              <a:rPr lang="pt-BR" sz="2000" u="sng" dirty="0">
+                <a:solidFill>
+                  <a:schemeClr val="accent2"/>
+                </a:solidFill>
+              </a:rPr>
+              <a:t> </a:t>
+            </a:r>
+            <a:r>
+              <a:rPr lang="pt-BR" sz="2000" u="sng" dirty="0" err="1">
+                <a:solidFill>
+                  <a:schemeClr val="accent2"/>
+                </a:solidFill>
+              </a:rPr>
+              <a:t>User</a:t>
+            </a:r>
+            <a:r>
+              <a:rPr lang="pt-BR" sz="2000" u="sng" dirty="0">
+                <a:solidFill>
+                  <a:schemeClr val="accent2"/>
+                </a:solidFill>
+              </a:rPr>
+              <a:t> Manual Volume </a:t>
+            </a:r>
+            <a:r>
+              <a:rPr lang="pt-BR" sz="2000" u="sng" dirty="0" smtClean="0">
+                <a:solidFill>
+                  <a:schemeClr val="accent2"/>
+                </a:solidFill>
+              </a:rPr>
+              <a:t>1</a:t>
+            </a:r>
+            <a:r>
+              <a:rPr lang="pt-BR" sz="2000" dirty="0" smtClean="0"/>
+              <a:t> </a:t>
+            </a:r>
+            <a:r>
+              <a:rPr lang="pt-BR" sz="2000" dirty="0" err="1"/>
+              <a:t>or</a:t>
+            </a:r>
+            <a:r>
+              <a:rPr lang="pt-BR" sz="2000" dirty="0"/>
+              <a:t> via </a:t>
+            </a:r>
+            <a:r>
+              <a:rPr lang="pt-BR" sz="2000" dirty="0" err="1"/>
+              <a:t>Dymola</a:t>
+            </a:r>
+            <a:r>
+              <a:rPr lang="pt-BR" sz="2000" dirty="0"/>
+              <a:t> &gt; help.</a:t>
+            </a:r>
+            <a:endParaRPr lang="en-GB" altLang="nl-BE" sz="2000" dirty="0"/>
+          </a:p>
+          <a:p>
             <a:endParaRPr lang="en-GB" dirty="0"/>
           </a:p>
         </p:txBody>
       </p:sp>
-      <p:sp>
-        <p:nvSpPr>
-          <p:cNvPr id="3" name="Content Placeholder 2"/>
+    </p:spTree>
+    <p:extLst>
+      <p:ext uri="{BB962C8B-B14F-4D97-AF65-F5344CB8AC3E}">
+        <p14:creationId xmlns:p14="http://schemas.microsoft.com/office/powerpoint/2010/main" val="2974380802"/>
+      </p:ext>
+    </p:extLst>
+  </p:cSld>
+  <p:clrMapOvr>
+    <a:masterClrMapping/>
+  </p:clrMapOvr>
+  <p:timing>
+    <p:tnLst>
+      <p:par>
+        <p:cTn id="1" dur="indefinite" restart="never" nodeType="tmRoot"/>
+      </p:par>
+    </p:tnLst>
+  </p:timing>
+</p:sld>
+</file>
+
+<file path=ppt/slides/slide34.xml><?xml version="1.0" encoding="utf-8"?>
+<p:sld xmlns:a="http://schemas.openxmlformats.org/drawingml/2006/main" xmlns:r="http://schemas.openxmlformats.org/officeDocument/2006/relationships" xmlns:p="http://schemas.openxmlformats.org/presentationml/2006/main">
+  <p:cSld>
+    <p:spTree>
+      <p:nvGrpSpPr>
+        <p:cNvPr id="1" name=""/>
+        <p:cNvGrpSpPr/>
+        <p:nvPr/>
+      </p:nvGrpSpPr>
+      <p:grpSpPr>
+        <a:xfrm>
+          <a:off x="0" y="0"/>
+          <a:ext cx="0" cy="0"/>
+          <a:chOff x="0" y="0"/>
+          <a:chExt cx="0" cy="0"/>
+        </a:xfrm>
+      </p:grpSpPr>
+      <p:sp>
+        <p:nvSpPr>
+          <p:cNvPr id="14338" name="Title 1"/>
+          <p:cNvSpPr>
+            <a:spLocks noGrp="1"/>
+          </p:cNvSpPr>
+          <p:nvPr>
+            <p:ph type="title"/>
+          </p:nvPr>
+        </p:nvSpPr>
+        <p:spPr/>
+        <p:txBody>
+          <a:bodyPr/>
+          <a:lstStyle/>
+          <a:p>
+            <a:r>
+              <a:rPr lang="en-GB" altLang="nl-BE" smtClean="0"/>
+              <a:t>Fora</a:t>
+            </a:r>
+          </a:p>
+        </p:txBody>
+      </p:sp>
+      <p:sp>
+        <p:nvSpPr>
+          <p:cNvPr id="14339" name="Content Placeholder 2"/>
           <p:cNvSpPr>
             <a:spLocks noGrp="1"/>
           </p:cNvSpPr>
@@ -14932,23 +15058,89 @@
           <a:lstStyle/>
           <a:p>
             <a:r>
-              <a:rPr lang="en-GB" dirty="0" smtClean="0"/>
-              <a:t>Time to activate and borrow your license!</a:t>
-            </a:r>
-            <a:endParaRPr lang="en-GB" dirty="0"/>
+              <a:rPr lang="en-GB" altLang="nl-BE" dirty="0" smtClean="0">
+                <a:hlinkClick r:id="rId2"/>
+              </a:rPr>
+              <a:t>http://www.openmodelica.org/index.php/forum</a:t>
+            </a:r>
+            <a:endParaRPr lang="en-GB" altLang="nl-BE" dirty="0" smtClean="0"/>
+          </a:p>
+          <a:p>
+            <a:r>
+              <a:rPr lang="en-GB" altLang="nl-BE" dirty="0" smtClean="0">
+                <a:hlinkClick r:id="rId3"/>
+              </a:rPr>
+              <a:t>http://www.jmodelica.org/forum</a:t>
+            </a:r>
+            <a:endParaRPr lang="en-GB" altLang="nl-BE" dirty="0" smtClean="0"/>
+          </a:p>
+          <a:p>
+            <a:r>
+              <a:rPr lang="en-GB" altLang="nl-BE" dirty="0" smtClean="0"/>
+              <a:t>www.stackoverflow.com (tag </a:t>
+            </a:r>
+            <a:r>
+              <a:rPr lang="en-GB" altLang="nl-BE" dirty="0" err="1" smtClean="0"/>
+              <a:t>Modelica</a:t>
+            </a:r>
+            <a:r>
+              <a:rPr lang="en-GB" altLang="nl-BE" dirty="0" smtClean="0"/>
+              <a:t>)</a:t>
+            </a:r>
+          </a:p>
+          <a:p>
+            <a:pPr>
+              <a:buFontTx/>
+              <a:buNone/>
+            </a:pPr>
+            <a:r>
+              <a:rPr lang="en-GB" altLang="nl-BE" dirty="0" smtClean="0"/>
+              <a:t>And last but not least: </a:t>
+            </a:r>
+            <a:r>
+              <a:rPr lang="en-GB" altLang="nl-BE" b="1" dirty="0" smtClean="0">
+                <a:solidFill>
+                  <a:srgbClr val="FF0000"/>
+                </a:solidFill>
+                <a:hlinkClick r:id="rId4"/>
+              </a:rPr>
+              <a:t>https://groups.google.com/d/forum/modelicans</a:t>
+            </a:r>
+            <a:endParaRPr lang="en-GB" altLang="nl-BE" b="1" dirty="0" smtClean="0">
+              <a:solidFill>
+                <a:srgbClr val="FF0000"/>
+              </a:solidFill>
+            </a:endParaRPr>
+          </a:p>
+          <a:p>
+            <a:pPr>
+              <a:buFontTx/>
+              <a:buNone/>
+            </a:pPr>
+            <a:endParaRPr lang="en-GB" altLang="nl-BE" dirty="0" smtClean="0"/>
+          </a:p>
+          <a:p>
+            <a:endParaRPr lang="en-GB" altLang="nl-BE" dirty="0" smtClean="0"/>
           </a:p>
         </p:txBody>
       </p:sp>
     </p:spTree>
     <p:extLst>
       <p:ext uri="{BB962C8B-B14F-4D97-AF65-F5344CB8AC3E}">
-        <p14:creationId xmlns:p14="http://schemas.microsoft.com/office/powerpoint/2010/main" val="130277479"/>
+        <p14:creationId xmlns:p14="http://schemas.microsoft.com/office/powerpoint/2010/main" val="1252393520"/>
       </p:ext>
     </p:extLst>
   </p:cSld>
   <p:clrMapOvr>
     <a:masterClrMapping/>
   </p:clrMapOvr>
+  <p:timing>
+    <p:tnLst>
+      <p:par>
+        <p:cTn id="1" dur="indefinite" restart="never" nodeType="tmRoot"/>
+      </p:par>
+    </p:tnLst>
+  </p:timing>
 </p:sld>
 </file>
 
@@ -15044,6 +15236,307 @@
 </file>
 
 <file path=ppt/slides/slide5.xml><?xml version="1.0" encoding="utf-8"?>
+<p:sld xmlns:a="http://schemas.openxmlformats.org/drawingml/2006/main" xmlns:r="http://schemas.openxmlformats.org/officeDocument/2006/relationships" xmlns:p="http://schemas.openxmlformats.org/presentationml/2006/main">
+  <p:cSld>
+    <p:spTree>
+      <p:nvGrpSpPr>
+        <p:cNvPr id="1" name=""/>
+        <p:cNvGrpSpPr/>
+        <p:nvPr/>
+      </p:nvGrpSpPr>
+      <p:grpSpPr>
+        <a:xfrm>
+          <a:off x="0" y="0"/>
+          <a:ext cx="0" cy="0"/>
+          <a:chOff x="0" y="0"/>
+          <a:chExt cx="0" cy="0"/>
+        </a:xfrm>
+      </p:grpSpPr>
+      <p:pic>
+        <p:nvPicPr>
+          <p:cNvPr id="7170" name="Picture 2"/>
+          <p:cNvPicPr>
+            <a:picLocks noChangeAspect="1" noChangeArrowheads="1"/>
+          </p:cNvPicPr>
+          <p:nvPr/>
+        </p:nvPicPr>
+        <p:blipFill>
+          <a:blip r:embed="rId2">
+            <a:extLst>
+              <a:ext uri="{28A0092B-C50C-407E-A947-70E740481C1C}">
+                <a14:useLocalDpi xmlns:a14="http://schemas.microsoft.com/office/drawing/2010/main" val="0"/>
+              </a:ext>
+            </a:extLst>
+          </a:blip>
+          <a:srcRect/>
+          <a:stretch>
+            <a:fillRect/>
+          </a:stretch>
+        </p:blipFill>
+        <p:spPr bwMode="auto">
+          <a:xfrm>
+            <a:off x="317500" y="238125"/>
+            <a:ext cx="9523413" cy="7142163"/>
+          </a:xfrm>
+          <a:prstGeom prst="rect">
+            <a:avLst/>
+          </a:prstGeom>
+          <a:noFill/>
+          <a:ln>
+            <a:noFill/>
+          </a:ln>
+          <a:extLst>
+            <a:ext uri="{909E8E84-426E-40DD-AFC4-6F175D3DCCD1}">
+              <a14:hiddenFill xmlns:a14="http://schemas.microsoft.com/office/drawing/2010/main">
+                <a:solidFill>
+                  <a:srgbClr val="FFFFFF"/>
+                </a:solidFill>
+              </a14:hiddenFill>
+            </a:ext>
+            <a:ext uri="{91240B29-F687-4F45-9708-019B960494DF}">
+              <a14:hiddenLine xmlns:a14="http://schemas.microsoft.com/office/drawing/2010/main" w="9525">
+                <a:solidFill>
+                  <a:srgbClr val="000000"/>
+                </a:solidFill>
+                <a:miter lim="800000"/>
+                <a:headEnd/>
+                <a:tailEnd/>
+              </a14:hiddenLine>
+            </a:ext>
+          </a:extLst>
+        </p:spPr>
+      </p:pic>
+      <p:sp>
+        <p:nvSpPr>
+          <p:cNvPr id="7171" name="TextBox 2"/>
+          <p:cNvSpPr txBox="1">
+            <a:spLocks noChangeArrowheads="1"/>
+          </p:cNvSpPr>
+          <p:nvPr/>
+        </p:nvSpPr>
+        <p:spPr bwMode="auto">
+          <a:xfrm>
+            <a:off x="471488" y="7370763"/>
+            <a:ext cx="9145587" cy="400050"/>
+          </a:xfrm>
+          <a:prstGeom prst="rect">
+            <a:avLst/>
+          </a:prstGeom>
+          <a:noFill/>
+          <a:ln>
+            <a:noFill/>
+          </a:ln>
+          <a:extLst>
+            <a:ext uri="{909E8E84-426E-40DD-AFC4-6F175D3DCCD1}">
+              <a14:hiddenFill xmlns:a14="http://schemas.microsoft.com/office/drawing/2010/main">
+                <a:solidFill>
+                  <a:srgbClr val="FFFFFF"/>
+                </a:solidFill>
+              </a14:hiddenFill>
+            </a:ext>
+            <a:ext uri="{91240B29-F687-4F45-9708-019B960494DF}">
+              <a14:hiddenLine xmlns:a14="http://schemas.microsoft.com/office/drawing/2010/main" w="9525">
+                <a:solidFill>
+                  <a:srgbClr val="000000"/>
+                </a:solidFill>
+                <a:miter lim="800000"/>
+                <a:headEnd/>
+                <a:tailEnd/>
+              </a14:hiddenLine>
+            </a:ext>
+          </a:extLst>
+        </p:spPr>
+        <p:txBody>
+          <a:bodyPr>
+            <a:spAutoFit/>
+          </a:bodyPr>
+          <a:lstStyle>
+            <a:lvl1pPr eaLnBrk="0" hangingPunct="0">
+              <a:spcBef>
+                <a:spcPct val="20000"/>
+              </a:spcBef>
+              <a:buChar char="•"/>
+              <a:defRPr sz="3200">
+                <a:solidFill>
+                  <a:schemeClr val="tx1"/>
+                </a:solidFill>
+                <a:latin typeface="Times New Roman" pitchFamily="18" charset="0"/>
+              </a:defRPr>
+            </a:lvl1pPr>
+            <a:lvl2pPr marL="742950" indent="-285750" eaLnBrk="0" hangingPunct="0">
+              <a:spcBef>
+                <a:spcPct val="20000"/>
+              </a:spcBef>
+              <a:buChar char="–"/>
+              <a:defRPr sz="2800">
+                <a:solidFill>
+                  <a:schemeClr val="tx1"/>
+                </a:solidFill>
+                <a:latin typeface="Times New Roman" pitchFamily="18" charset="0"/>
+              </a:defRPr>
+            </a:lvl2pPr>
+            <a:lvl3pPr marL="1143000" indent="-228600" eaLnBrk="0" hangingPunct="0">
+              <a:spcBef>
+                <a:spcPct val="20000"/>
+              </a:spcBef>
+              <a:buChar char="•"/>
+              <a:defRPr sz="2400">
+                <a:solidFill>
+                  <a:schemeClr val="tx1"/>
+                </a:solidFill>
+                <a:latin typeface="Times New Roman" pitchFamily="18" charset="0"/>
+              </a:defRPr>
+            </a:lvl3pPr>
+            <a:lvl4pPr marL="1600200" indent="-228600" eaLnBrk="0" hangingPunct="0">
+              <a:spcBef>
+                <a:spcPct val="20000"/>
+              </a:spcBef>
+              <a:buChar char="–"/>
+              <a:defRPr sz="2000">
+                <a:solidFill>
+                  <a:schemeClr val="tx1"/>
+                </a:solidFill>
+                <a:latin typeface="Times New Roman" pitchFamily="18" charset="0"/>
+              </a:defRPr>
+            </a:lvl4pPr>
+            <a:lvl5pPr marL="2057400" indent="-228600" eaLnBrk="0" hangingPunct="0">
+              <a:spcBef>
+                <a:spcPct val="20000"/>
+              </a:spcBef>
+              <a:buChar char="»"/>
+              <a:defRPr sz="2000">
+                <a:solidFill>
+                  <a:schemeClr val="tx1"/>
+                </a:solidFill>
+                <a:latin typeface="Times New Roman" pitchFamily="18" charset="0"/>
+              </a:defRPr>
+            </a:lvl5pPr>
+            <a:lvl6pPr marL="2514600" indent="-228600" eaLnBrk="0" fontAlgn="base" hangingPunct="0">
+              <a:spcBef>
+                <a:spcPct val="20000"/>
+              </a:spcBef>
+              <a:spcAft>
+                <a:spcPct val="0"/>
+              </a:spcAft>
+              <a:buChar char="»"/>
+              <a:defRPr sz="2000">
+                <a:solidFill>
+                  <a:schemeClr val="tx1"/>
+                </a:solidFill>
+                <a:latin typeface="Times New Roman" pitchFamily="18" charset="0"/>
+              </a:defRPr>
+            </a:lvl6pPr>
+            <a:lvl7pPr marL="2971800" indent="-228600" eaLnBrk="0" fontAlgn="base" hangingPunct="0">
+              <a:spcBef>
+                <a:spcPct val="20000"/>
+              </a:spcBef>
+              <a:spcAft>
+                <a:spcPct val="0"/>
+              </a:spcAft>
+              <a:buChar char="»"/>
+              <a:defRPr sz="2000">
+                <a:solidFill>
+                  <a:schemeClr val="tx1"/>
+                </a:solidFill>
+                <a:latin typeface="Times New Roman" pitchFamily="18" charset="0"/>
+              </a:defRPr>
+            </a:lvl7pPr>
+            <a:lvl8pPr marL="3429000" indent="-228600" eaLnBrk="0" fontAlgn="base" hangingPunct="0">
+              <a:spcBef>
+                <a:spcPct val="20000"/>
+              </a:spcBef>
+              <a:spcAft>
+                <a:spcPct val="0"/>
+              </a:spcAft>
+              <a:buChar char="»"/>
+              <a:defRPr sz="2000">
+                <a:solidFill>
+                  <a:schemeClr val="tx1"/>
+                </a:solidFill>
+                <a:latin typeface="Times New Roman" pitchFamily="18" charset="0"/>
+              </a:defRPr>
+            </a:lvl8pPr>
+            <a:lvl9pPr marL="3886200" indent="-228600" eaLnBrk="0" fontAlgn="base" hangingPunct="0">
+              <a:spcBef>
+                <a:spcPct val="20000"/>
+              </a:spcBef>
+              <a:spcAft>
+                <a:spcPct val="0"/>
+              </a:spcAft>
+              <a:buChar char="»"/>
+              <a:defRPr sz="2000">
+                <a:solidFill>
+                  <a:schemeClr val="tx1"/>
+                </a:solidFill>
+                <a:latin typeface="Times New Roman" pitchFamily="18" charset="0"/>
+              </a:defRPr>
+            </a:lvl9pPr>
+          </a:lstStyle>
+          <a:p>
+            <a:pPr eaLnBrk="1" hangingPunct="1">
+              <a:spcBef>
+                <a:spcPct val="0"/>
+              </a:spcBef>
+              <a:buFontTx/>
+              <a:buNone/>
+            </a:pPr>
+            <a:r>
+              <a:rPr lang="en-GB" altLang="nl-BE" sz="1000">
+                <a:latin typeface="Arial" charset="0"/>
+                <a:cs typeface="Arial" charset="0"/>
+              </a:rPr>
+              <a:t>Slide from </a:t>
+            </a:r>
+            <a:r>
+              <a:rPr lang="pt-BR" altLang="nl-BE" sz="1000">
+                <a:latin typeface="Arial" charset="0"/>
+                <a:cs typeface="Arial" charset="0"/>
+              </a:rPr>
+              <a:t>Peter Fritzson, </a:t>
+            </a:r>
+            <a:r>
+              <a:rPr lang="en-GB" altLang="nl-BE" sz="1000">
+                <a:latin typeface="Arial" charset="0"/>
+                <a:cs typeface="Arial" charset="0"/>
+              </a:rPr>
+              <a:t>Introduction to Object-Oriented Modeling, Simulation and Control with Modelica, </a:t>
+            </a:r>
+            <a:r>
+              <a:rPr lang="pt-BR" altLang="nl-BE" sz="1000">
+                <a:latin typeface="Arial" charset="0"/>
+                <a:cs typeface="Arial" charset="0"/>
+              </a:rPr>
+              <a:t>Tutorial for Modelica Conference 2011,  Dresden</a:t>
+            </a:r>
+          </a:p>
+          <a:p>
+            <a:pPr eaLnBrk="1" hangingPunct="1">
+              <a:spcBef>
+                <a:spcPct val="0"/>
+              </a:spcBef>
+              <a:buFontTx/>
+              <a:buNone/>
+            </a:pPr>
+            <a:endParaRPr lang="en-GB" altLang="nl-BE" sz="1000"/>
+          </a:p>
+        </p:txBody>
+      </p:sp>
+    </p:spTree>
+  </p:cSld>
+  <p:clrMapOvr>
+    <a:masterClrMapping/>
+  </p:clrMapOvr>
+  <p:timing>
+    <p:tnLst>
+      <p:par>
+        <p:cTn id="1" dur="indefinite" restart="never" nodeType="tmRoot"/>
+      </p:par>
+    </p:tnLst>
+  </p:timing>
+</p:sld>
+</file>
+
+<file path=ppt/slides/slide6.xml><?xml version="1.0" encoding="utf-8"?>
 <p:sld xmlns:a="http://schemas.openxmlformats.org/drawingml/2006/main" xmlns:r="http://schemas.openxmlformats.org/officeDocument/2006/relationships" xmlns:p="http://schemas.openxmlformats.org/presentationml/2006/main">
   <p:cSld>
     <p:spTree>
@@ -15372,7 +15865,7 @@
 </p:sld>
 </file>
 
-<file path=ppt/slides/slide6.xml><?xml version="1.0" encoding="utf-8"?>
+<file path=ppt/slides/slide7.xml><?xml version="1.0" encoding="utf-8"?>
 <p:sld xmlns:a="http://schemas.openxmlformats.org/drawingml/2006/main" xmlns:r="http://schemas.openxmlformats.org/officeDocument/2006/relationships" xmlns:p="http://schemas.openxmlformats.org/presentationml/2006/main">
   <p:cSld>
     <p:spTree>
@@ -15683,307 +16176,6 @@
               <a:buNone/>
             </a:pPr>
             <a:endParaRPr lang="en-GB" altLang="nl-BE" sz="1000" dirty="0"/>
-          </a:p>
-        </p:txBody>
-      </p:sp>
-    </p:spTree>
-  </p:cSld>
-  <p:clrMapOvr>
-    <a:masterClrMapping/>
-  </p:clrMapOvr>
-  <p:timing>
-    <p:tnLst>
-      <p:par>
-        <p:cTn id="1" dur="indefinite" restart="never" nodeType="tmRoot"/>
-      </p:par>
-    </p:tnLst>
-  </p:timing>
-</p:sld>
-</file>
-
-<file path=ppt/slides/slide7.xml><?xml version="1.0" encoding="utf-8"?>
-<p:sld xmlns:a="http://schemas.openxmlformats.org/drawingml/2006/main" xmlns:r="http://schemas.openxmlformats.org/officeDocument/2006/relationships" xmlns:p="http://schemas.openxmlformats.org/presentationml/2006/main">
-  <p:cSld>
-    <p:spTree>
-      <p:nvGrpSpPr>
-        <p:cNvPr id="1" name=""/>
-        <p:cNvGrpSpPr/>
-        <p:nvPr/>
-      </p:nvGrpSpPr>
-      <p:grpSpPr>
-        <a:xfrm>
-          <a:off x="0" y="0"/>
-          <a:ext cx="0" cy="0"/>
-          <a:chOff x="0" y="0"/>
-          <a:chExt cx="0" cy="0"/>
-        </a:xfrm>
-      </p:grpSpPr>
-      <p:pic>
-        <p:nvPicPr>
-          <p:cNvPr id="7170" name="Picture 2"/>
-          <p:cNvPicPr>
-            <a:picLocks noChangeAspect="1" noChangeArrowheads="1"/>
-          </p:cNvPicPr>
-          <p:nvPr/>
-        </p:nvPicPr>
-        <p:blipFill>
-          <a:blip r:embed="rId2">
-            <a:extLst>
-              <a:ext uri="{28A0092B-C50C-407E-A947-70E740481C1C}">
-                <a14:useLocalDpi xmlns:a14="http://schemas.microsoft.com/office/drawing/2010/main" val="0"/>
-              </a:ext>
-            </a:extLst>
-          </a:blip>
-          <a:srcRect/>
-          <a:stretch>
-            <a:fillRect/>
-          </a:stretch>
-        </p:blipFill>
-        <p:spPr bwMode="auto">
-          <a:xfrm>
-            <a:off x="317500" y="238125"/>
-            <a:ext cx="9523413" cy="7142163"/>
-          </a:xfrm>
-          <a:prstGeom prst="rect">
-            <a:avLst/>
-          </a:prstGeom>
-          <a:noFill/>
-          <a:ln>
-            <a:noFill/>
-          </a:ln>
-          <a:extLst>
-            <a:ext uri="{909E8E84-426E-40DD-AFC4-6F175D3DCCD1}">
-              <a14:hiddenFill xmlns:a14="http://schemas.microsoft.com/office/drawing/2010/main">
-                <a:solidFill>
-                  <a:srgbClr val="FFFFFF"/>
-                </a:solidFill>
-              </a14:hiddenFill>
-            </a:ext>
-            <a:ext uri="{91240B29-F687-4F45-9708-019B960494DF}">
-              <a14:hiddenLine xmlns:a14="http://schemas.microsoft.com/office/drawing/2010/main" w="9525">
-                <a:solidFill>
-                  <a:srgbClr val="000000"/>
-                </a:solidFill>
-                <a:miter lim="800000"/>
-                <a:headEnd/>
-                <a:tailEnd/>
-              </a14:hiddenLine>
-            </a:ext>
-          </a:extLst>
-        </p:spPr>
-      </p:pic>
-      <p:sp>
-        <p:nvSpPr>
-          <p:cNvPr id="7171" name="TextBox 2"/>
-          <p:cNvSpPr txBox="1">
-            <a:spLocks noChangeArrowheads="1"/>
-          </p:cNvSpPr>
-          <p:nvPr/>
-        </p:nvSpPr>
-        <p:spPr bwMode="auto">
-          <a:xfrm>
-            <a:off x="471488" y="7370763"/>
-            <a:ext cx="9145587" cy="400050"/>
-          </a:xfrm>
-          <a:prstGeom prst="rect">
-            <a:avLst/>
-          </a:prstGeom>
-          <a:noFill/>
-          <a:ln>
-            <a:noFill/>
-          </a:ln>
-          <a:extLst>
-            <a:ext uri="{909E8E84-426E-40DD-AFC4-6F175D3DCCD1}">
-              <a14:hiddenFill xmlns:a14="http://schemas.microsoft.com/office/drawing/2010/main">
-                <a:solidFill>
-                  <a:srgbClr val="FFFFFF"/>
-                </a:solidFill>
-              </a14:hiddenFill>
-            </a:ext>
-            <a:ext uri="{91240B29-F687-4F45-9708-019B960494DF}">
-              <a14:hiddenLine xmlns:a14="http://schemas.microsoft.com/office/drawing/2010/main" w="9525">
-                <a:solidFill>
-                  <a:srgbClr val="000000"/>
-                </a:solidFill>
-                <a:miter lim="800000"/>
-                <a:headEnd/>
-                <a:tailEnd/>
-              </a14:hiddenLine>
-            </a:ext>
-          </a:extLst>
-        </p:spPr>
-        <p:txBody>
-          <a:bodyPr>
-            <a:spAutoFit/>
-          </a:bodyPr>
-          <a:lstStyle>
-            <a:lvl1pPr eaLnBrk="0" hangingPunct="0">
-              <a:spcBef>
-                <a:spcPct val="20000"/>
-              </a:spcBef>
-              <a:buChar char="•"/>
-              <a:defRPr sz="3200">
-                <a:solidFill>
-                  <a:schemeClr val="tx1"/>
-                </a:solidFill>
-                <a:latin typeface="Times New Roman" pitchFamily="18" charset="0"/>
-              </a:defRPr>
-            </a:lvl1pPr>
-            <a:lvl2pPr marL="742950" indent="-285750" eaLnBrk="0" hangingPunct="0">
-              <a:spcBef>
-                <a:spcPct val="20000"/>
-              </a:spcBef>
-              <a:buChar char="–"/>
-              <a:defRPr sz="2800">
-                <a:solidFill>
-                  <a:schemeClr val="tx1"/>
-                </a:solidFill>
-                <a:latin typeface="Times New Roman" pitchFamily="18" charset="0"/>
-              </a:defRPr>
-            </a:lvl2pPr>
-            <a:lvl3pPr marL="1143000" indent="-228600" eaLnBrk="0" hangingPunct="0">
-              <a:spcBef>
-                <a:spcPct val="20000"/>
-              </a:spcBef>
-              <a:buChar char="•"/>
-              <a:defRPr sz="2400">
-                <a:solidFill>
-                  <a:schemeClr val="tx1"/>
-                </a:solidFill>
-                <a:latin typeface="Times New Roman" pitchFamily="18" charset="0"/>
-              </a:defRPr>
-            </a:lvl3pPr>
-            <a:lvl4pPr marL="1600200" indent="-228600" eaLnBrk="0" hangingPunct="0">
-              <a:spcBef>
-                <a:spcPct val="20000"/>
-              </a:spcBef>
-              <a:buChar char="–"/>
-              <a:defRPr sz="2000">
-                <a:solidFill>
-                  <a:schemeClr val="tx1"/>
-                </a:solidFill>
-                <a:latin typeface="Times New Roman" pitchFamily="18" charset="0"/>
-              </a:defRPr>
-            </a:lvl4pPr>
-            <a:lvl5pPr marL="2057400" indent="-228600" eaLnBrk="0" hangingPunct="0">
-              <a:spcBef>
-                <a:spcPct val="20000"/>
-              </a:spcBef>
-              <a:buChar char="»"/>
-              <a:defRPr sz="2000">
-                <a:solidFill>
-                  <a:schemeClr val="tx1"/>
-                </a:solidFill>
-                <a:latin typeface="Times New Roman" pitchFamily="18" charset="0"/>
-              </a:defRPr>
-            </a:lvl5pPr>
-            <a:lvl6pPr marL="2514600" indent="-228600" eaLnBrk="0" fontAlgn="base" hangingPunct="0">
-              <a:spcBef>
-                <a:spcPct val="20000"/>
-              </a:spcBef>
-              <a:spcAft>
-                <a:spcPct val="0"/>
-              </a:spcAft>
-              <a:buChar char="»"/>
-              <a:defRPr sz="2000">
-                <a:solidFill>
-                  <a:schemeClr val="tx1"/>
-                </a:solidFill>
-                <a:latin typeface="Times New Roman" pitchFamily="18" charset="0"/>
-              </a:defRPr>
-            </a:lvl6pPr>
-            <a:lvl7pPr marL="2971800" indent="-228600" eaLnBrk="0" fontAlgn="base" hangingPunct="0">
-              <a:spcBef>
-                <a:spcPct val="20000"/>
-              </a:spcBef>
-              <a:spcAft>
-                <a:spcPct val="0"/>
-              </a:spcAft>
-              <a:buChar char="»"/>
-              <a:defRPr sz="2000">
-                <a:solidFill>
-                  <a:schemeClr val="tx1"/>
-                </a:solidFill>
-                <a:latin typeface="Times New Roman" pitchFamily="18" charset="0"/>
-              </a:defRPr>
-            </a:lvl7pPr>
-            <a:lvl8pPr marL="3429000" indent="-228600" eaLnBrk="0" fontAlgn="base" hangingPunct="0">
-              <a:spcBef>
-                <a:spcPct val="20000"/>
-              </a:spcBef>
-              <a:spcAft>
-                <a:spcPct val="0"/>
-              </a:spcAft>
-              <a:buChar char="»"/>
-              <a:defRPr sz="2000">
-                <a:solidFill>
-                  <a:schemeClr val="tx1"/>
-                </a:solidFill>
-                <a:latin typeface="Times New Roman" pitchFamily="18" charset="0"/>
-              </a:defRPr>
-            </a:lvl8pPr>
-            <a:lvl9pPr marL="3886200" indent="-228600" eaLnBrk="0" fontAlgn="base" hangingPunct="0">
-              <a:spcBef>
-                <a:spcPct val="20000"/>
-              </a:spcBef>
-              <a:spcAft>
-                <a:spcPct val="0"/>
-              </a:spcAft>
-              <a:buChar char="»"/>
-              <a:defRPr sz="2000">
-                <a:solidFill>
-                  <a:schemeClr val="tx1"/>
-                </a:solidFill>
-                <a:latin typeface="Times New Roman" pitchFamily="18" charset="0"/>
-              </a:defRPr>
-            </a:lvl9pPr>
-          </a:lstStyle>
-          <a:p>
-            <a:pPr eaLnBrk="1" hangingPunct="1">
-              <a:spcBef>
-                <a:spcPct val="0"/>
-              </a:spcBef>
-              <a:buFontTx/>
-              <a:buNone/>
-            </a:pPr>
-            <a:r>
-              <a:rPr lang="en-GB" altLang="nl-BE" sz="1000">
-                <a:latin typeface="Arial" charset="0"/>
-                <a:cs typeface="Arial" charset="0"/>
-              </a:rPr>
-              <a:t>Slide from </a:t>
-            </a:r>
-            <a:r>
-              <a:rPr lang="pt-BR" altLang="nl-BE" sz="1000">
-                <a:latin typeface="Arial" charset="0"/>
-                <a:cs typeface="Arial" charset="0"/>
-              </a:rPr>
-              <a:t>Peter Fritzson, </a:t>
-            </a:r>
-            <a:r>
-              <a:rPr lang="en-GB" altLang="nl-BE" sz="1000">
-                <a:latin typeface="Arial" charset="0"/>
-                <a:cs typeface="Arial" charset="0"/>
-              </a:rPr>
-              <a:t>Introduction to Object-Oriented Modeling, Simulation and Control with Modelica, </a:t>
-            </a:r>
-            <a:r>
-              <a:rPr lang="pt-BR" altLang="nl-BE" sz="1000">
-                <a:latin typeface="Arial" charset="0"/>
-                <a:cs typeface="Arial" charset="0"/>
-              </a:rPr>
-              <a:t>Tutorial for Modelica Conference 2011,  Dresden</a:t>
-            </a:r>
-          </a:p>
-          <a:p>
-            <a:pPr eaLnBrk="1" hangingPunct="1">
-              <a:spcBef>
-                <a:spcPct val="0"/>
-              </a:spcBef>
-              <a:buFontTx/>
-              <a:buNone/>
-            </a:pPr>
-            <a:endParaRPr lang="en-GB" altLang="nl-BE" sz="1000"/>
           </a:p>
         </p:txBody>
       </p:sp>

</xml_diff>